<commit_message>
updates n°2 suite à réunion Seb
</commit_message>
<xml_diff>
--- a/report/Projet_classification_MLOps_Partie2_Sarah.pptx
+++ b/report/Projet_classification_MLOps_Partie2_Sarah.pptx
@@ -5,16 +5,17 @@
     <p:sldMasterId id="2147483666" r:id="rId4"/>
   </p:sldMasterIdLst>
   <p:notesMasterIdLst>
-    <p:notesMasterId r:id="rId9"/>
+    <p:notesMasterId r:id="rId10"/>
   </p:notesMasterIdLst>
   <p:handoutMasterIdLst>
-    <p:handoutMasterId r:id="rId10"/>
+    <p:handoutMasterId r:id="rId11"/>
   </p:handoutMasterIdLst>
   <p:sldIdLst>
     <p:sldId id="289" r:id="rId5"/>
     <p:sldId id="287" r:id="rId6"/>
     <p:sldId id="284" r:id="rId7"/>
-    <p:sldId id="286" r:id="rId8"/>
+    <p:sldId id="290" r:id="rId8"/>
+    <p:sldId id="286" r:id="rId9"/>
   </p:sldIdLst>
   <p:sldSz cx="12192000" cy="6858000"/>
   <p:notesSz cx="6858000" cy="9144000"/>
@@ -16731,6 +16732,169 @@
       </p:grpSpPr>
       <p:grpSp>
         <p:nvGrpSpPr>
+          <p:cNvPr id="141" name="Groupe 140">
+            <a:extLst>
+              <a:ext uri="{FF2B5EF4-FFF2-40B4-BE49-F238E27FC236}">
+                <a16:creationId xmlns:a16="http://schemas.microsoft.com/office/drawing/2014/main" id="{67D15848-04FC-FE67-C1A5-D1E3705CFCFB}"/>
+              </a:ext>
+            </a:extLst>
+          </p:cNvPr>
+          <p:cNvGrpSpPr/>
+          <p:nvPr/>
+        </p:nvGrpSpPr>
+        <p:grpSpPr>
+          <a:xfrm>
+            <a:off x="3491849" y="3545869"/>
+            <a:ext cx="982641" cy="969486"/>
+            <a:chOff x="3724650" y="3670213"/>
+            <a:chExt cx="982641" cy="969486"/>
+          </a:xfrm>
+        </p:grpSpPr>
+        <p:sp>
+          <p:nvSpPr>
+            <p:cNvPr id="140" name="ZoneTexte 139">
+              <a:extLst>
+                <a:ext uri="{FF2B5EF4-FFF2-40B4-BE49-F238E27FC236}">
+                  <a16:creationId xmlns:a16="http://schemas.microsoft.com/office/drawing/2014/main" id="{7E527822-273A-85D6-64BE-54F1A62443CA}"/>
+                </a:ext>
+              </a:extLst>
+            </p:cNvPr>
+            <p:cNvSpPr txBox="1"/>
+            <p:nvPr/>
+          </p:nvSpPr>
+          <p:spPr>
+            <a:xfrm>
+              <a:off x="3724650" y="3670213"/>
+              <a:ext cx="982641" cy="276999"/>
+            </a:xfrm>
+            <a:prstGeom prst="rect">
+              <a:avLst/>
+            </a:prstGeom>
+            <a:solidFill>
+              <a:schemeClr val="bg1"/>
+            </a:solidFill>
+          </p:spPr>
+          <p:txBody>
+            <a:bodyPr wrap="none" rtlCol="0">
+              <a:spAutoFit/>
+            </a:bodyPr>
+            <a:lstStyle/>
+            <a:p>
+              <a:r>
+                <a:rPr lang="fr-FR" sz="1200" dirty="0" err="1">
+                  <a:solidFill>
+                    <a:schemeClr val="accent6">
+                      <a:lumMod val="75000"/>
+                    </a:schemeClr>
+                  </a:solidFill>
+                </a:rPr>
+                <a:t>Ocerized</a:t>
+              </a:r>
+              <a:r>
+                <a:rPr lang="fr-FR" sz="1200" dirty="0">
+                  <a:solidFill>
+                    <a:schemeClr val="accent6">
+                      <a:lumMod val="75000"/>
+                    </a:schemeClr>
+                  </a:solidFill>
+                </a:rPr>
+                <a:t> txt</a:t>
+              </a:r>
+            </a:p>
+          </p:txBody>
+        </p:sp>
+        <p:pic>
+          <p:nvPicPr>
+            <p:cNvPr id="75" name="Graphique 74" descr="Base de données avec un remplissage uni">
+              <a:extLst>
+                <a:ext uri="{FF2B5EF4-FFF2-40B4-BE49-F238E27FC236}">
+                  <a16:creationId xmlns:a16="http://schemas.microsoft.com/office/drawing/2014/main" id="{0A3733F4-D476-2671-E15B-41D6793A0D29}"/>
+                </a:ext>
+              </a:extLst>
+            </p:cNvPr>
+            <p:cNvPicPr>
+              <a:picLocks noChangeAspect="1"/>
+            </p:cNvPicPr>
+            <p:nvPr/>
+          </p:nvPicPr>
+          <p:blipFill>
+            <a:blip r:embed="rId2">
+              <a:extLst>
+                <a:ext uri="{96DAC541-7B7A-43D3-8B79-37D633B846F1}">
+                  <asvg:svgBlip xmlns:asvg="http://schemas.microsoft.com/office/drawing/2016/SVG/main" r:embed="rId3"/>
+                </a:ext>
+              </a:extLst>
+            </a:blip>
+            <a:stretch>
+              <a:fillRect/>
+            </a:stretch>
+          </p:blipFill>
+          <p:spPr>
+            <a:xfrm>
+              <a:off x="3823097" y="3917546"/>
+              <a:ext cx="722153" cy="722153"/>
+            </a:xfrm>
+            <a:prstGeom prst="rect">
+              <a:avLst/>
+            </a:prstGeom>
+          </p:spPr>
+        </p:pic>
+      </p:grpSp>
+      <p:sp>
+        <p:nvSpPr>
+          <p:cNvPr id="23" name="ZoneTexte 22">
+            <a:extLst>
+              <a:ext uri="{FF2B5EF4-FFF2-40B4-BE49-F238E27FC236}">
+                <a16:creationId xmlns:a16="http://schemas.microsoft.com/office/drawing/2014/main" id="{CBF78090-2E5D-353A-70C2-AB0653E59605}"/>
+              </a:ext>
+            </a:extLst>
+          </p:cNvPr>
+          <p:cNvSpPr txBox="1"/>
+          <p:nvPr/>
+        </p:nvSpPr>
+        <p:spPr>
+          <a:xfrm>
+            <a:off x="3510648" y="3545870"/>
+            <a:ext cx="947760" cy="276999"/>
+          </a:xfrm>
+          <a:prstGeom prst="rect">
+            <a:avLst/>
+          </a:prstGeom>
+          <a:solidFill>
+            <a:schemeClr val="bg1"/>
+          </a:solidFill>
+        </p:spPr>
+        <p:txBody>
+          <a:bodyPr wrap="none" rtlCol="0">
+            <a:spAutoFit/>
+          </a:bodyPr>
+          <a:lstStyle/>
+          <a:p>
+            <a:r>
+              <a:rPr lang="fr-FR" sz="1200" dirty="0" err="1">
+                <a:solidFill>
+                  <a:schemeClr val="accent6">
+                    <a:lumMod val="75000"/>
+                  </a:schemeClr>
+                </a:solidFill>
+              </a:rPr>
+              <a:t>Cleaned</a:t>
+            </a:r>
+            <a:r>
+              <a:rPr lang="fr-FR" sz="1200" dirty="0">
+                <a:solidFill>
+                  <a:schemeClr val="accent6">
+                    <a:lumMod val="75000"/>
+                  </a:schemeClr>
+                </a:solidFill>
+              </a:rPr>
+              <a:t> txt</a:t>
+            </a:r>
+          </a:p>
+        </p:txBody>
+      </p:sp>
+      <p:grpSp>
+        <p:nvGrpSpPr>
           <p:cNvPr id="88" name="Groupe 87">
             <a:extLst>
               <a:ext uri="{FF2B5EF4-FFF2-40B4-BE49-F238E27FC236}">
@@ -16816,7 +16980,7 @@
             <p:nvPr/>
           </p:nvPicPr>
           <p:blipFill>
-            <a:blip r:embed="rId2"/>
+            <a:blip r:embed="rId4"/>
             <a:stretch>
               <a:fillRect/>
             </a:stretch>
@@ -16978,7 +17142,7 @@
             <p:nvPr/>
           </p:nvPicPr>
           <p:blipFill>
-            <a:blip r:embed="rId2"/>
+            <a:blip r:embed="rId4"/>
             <a:stretch>
               <a:fillRect/>
             </a:stretch>
@@ -17587,7 +17751,7 @@
             <p:nvPr/>
           </p:nvPicPr>
           <p:blipFill>
-            <a:blip r:embed="rId2"/>
+            <a:blip r:embed="rId4"/>
             <a:stretch>
               <a:fillRect/>
             </a:stretch>
@@ -17751,7 +17915,7 @@
             <p:nvPr/>
           </p:nvPicPr>
           <p:blipFill>
-            <a:blip r:embed="rId2"/>
+            <a:blip r:embed="rId4"/>
             <a:stretch>
               <a:fillRect/>
             </a:stretch>
@@ -17816,11 +17980,11 @@
           <a:p>
             <a:pPr algn="ctr"/>
             <a:r>
-              <a:rPr lang="fr-FR" sz="1400" dirty="0" err="1"/>
+              <a:rPr lang="fr-FR" sz="1400" b="1" dirty="0" err="1"/>
               <a:t>dvc</a:t>
             </a:r>
             <a:r>
-              <a:rPr lang="fr-FR" sz="1400" dirty="0"/>
+              <a:rPr lang="fr-FR" sz="1400" b="1" dirty="0"/>
               <a:t> repro</a:t>
             </a:r>
           </a:p>
@@ -18507,7 +18671,7 @@
             <p:nvPr/>
           </p:nvPicPr>
           <p:blipFill>
-            <a:blip r:embed="rId2"/>
+            <a:blip r:embed="rId4"/>
             <a:stretch>
               <a:fillRect/>
             </a:stretch>
@@ -18811,7 +18975,7 @@
           <p:nvPr/>
         </p:nvPicPr>
         <p:blipFill>
-          <a:blip r:embed="rId3"/>
+          <a:blip r:embed="rId5"/>
           <a:srcRect l="-3197" t="27080" r="-3106" b="27204"/>
           <a:stretch/>
         </p:blipFill>
@@ -18840,7 +19004,7 @@
           <p:nvPr/>
         </p:nvPicPr>
         <p:blipFill>
-          <a:blip r:embed="rId4"/>
+          <a:blip r:embed="rId6"/>
           <a:srcRect l="30906" t="24775" r="30861" b="29405"/>
           <a:stretch/>
         </p:blipFill>
@@ -19167,10 +19331,10 @@
             <p:nvPr/>
           </p:nvPicPr>
           <p:blipFill>
-            <a:blip r:embed="rId5">
+            <a:blip r:embed="rId2">
               <a:extLst>
                 <a:ext uri="{96DAC541-7B7A-43D3-8B79-37D633B846F1}">
-                  <asvg:svgBlip xmlns:asvg="http://schemas.microsoft.com/office/drawing/2016/SVG/main" r:embed="rId6"/>
+                  <asvg:svgBlip xmlns:asvg="http://schemas.microsoft.com/office/drawing/2016/SVG/main" r:embed="rId7"/>
                 </a:ext>
               </a:extLst>
             </a:blip>
@@ -19232,104 +19396,6 @@
       </p:grpSp>
       <p:grpSp>
         <p:nvGrpSpPr>
-          <p:cNvPr id="141" name="Groupe 140">
-            <a:extLst>
-              <a:ext uri="{FF2B5EF4-FFF2-40B4-BE49-F238E27FC236}">
-                <a16:creationId xmlns:a16="http://schemas.microsoft.com/office/drawing/2014/main" id="{67D15848-04FC-FE67-C1A5-D1E3705CFCFB}"/>
-              </a:ext>
-            </a:extLst>
-          </p:cNvPr>
-          <p:cNvGrpSpPr/>
-          <p:nvPr/>
-        </p:nvGrpSpPr>
-        <p:grpSpPr>
-          <a:xfrm>
-            <a:off x="3590296" y="3581387"/>
-            <a:ext cx="722153" cy="933968"/>
-            <a:chOff x="3823097" y="3705731"/>
-            <a:chExt cx="722153" cy="933968"/>
-          </a:xfrm>
-        </p:grpSpPr>
-        <p:pic>
-          <p:nvPicPr>
-            <p:cNvPr id="75" name="Graphique 74" descr="Base de données avec un remplissage uni">
-              <a:extLst>
-                <a:ext uri="{FF2B5EF4-FFF2-40B4-BE49-F238E27FC236}">
-                  <a16:creationId xmlns:a16="http://schemas.microsoft.com/office/drawing/2014/main" id="{0A3733F4-D476-2671-E15B-41D6793A0D29}"/>
-                </a:ext>
-              </a:extLst>
-            </p:cNvPr>
-            <p:cNvPicPr>
-              <a:picLocks noChangeAspect="1"/>
-            </p:cNvPicPr>
-            <p:nvPr/>
-          </p:nvPicPr>
-          <p:blipFill>
-            <a:blip r:embed="rId5">
-              <a:extLst>
-                <a:ext uri="{96DAC541-7B7A-43D3-8B79-37D633B846F1}">
-                  <asvg:svgBlip xmlns:asvg="http://schemas.microsoft.com/office/drawing/2016/SVG/main" r:embed="rId7"/>
-                </a:ext>
-              </a:extLst>
-            </a:blip>
-            <a:stretch>
-              <a:fillRect/>
-            </a:stretch>
-          </p:blipFill>
-          <p:spPr>
-            <a:xfrm>
-              <a:off x="3823097" y="3917546"/>
-              <a:ext cx="722153" cy="722153"/>
-            </a:xfrm>
-            <a:prstGeom prst="rect">
-              <a:avLst/>
-            </a:prstGeom>
-          </p:spPr>
-        </p:pic>
-        <p:sp>
-          <p:nvSpPr>
-            <p:cNvPr id="140" name="ZoneTexte 139">
-              <a:extLst>
-                <a:ext uri="{FF2B5EF4-FFF2-40B4-BE49-F238E27FC236}">
-                  <a16:creationId xmlns:a16="http://schemas.microsoft.com/office/drawing/2014/main" id="{7E527822-273A-85D6-64BE-54F1A62443CA}"/>
-                </a:ext>
-              </a:extLst>
-            </p:cNvPr>
-            <p:cNvSpPr txBox="1"/>
-            <p:nvPr/>
-          </p:nvSpPr>
-          <p:spPr>
-            <a:xfrm>
-              <a:off x="3977097" y="3705731"/>
-              <a:ext cx="372218" cy="276999"/>
-            </a:xfrm>
-            <a:prstGeom prst="rect">
-              <a:avLst/>
-            </a:prstGeom>
-            <a:noFill/>
-          </p:spPr>
-          <p:txBody>
-            <a:bodyPr wrap="none" rtlCol="0">
-              <a:spAutoFit/>
-            </a:bodyPr>
-            <a:lstStyle/>
-            <a:p>
-              <a:r>
-                <a:rPr lang="fr-FR" sz="1200" dirty="0">
-                  <a:solidFill>
-                    <a:schemeClr val="accent6">
-                      <a:lumMod val="75000"/>
-                    </a:schemeClr>
-                  </a:solidFill>
-                </a:rPr>
-                <a:t>txt</a:t>
-              </a:r>
-            </a:p>
-          </p:txBody>
-        </p:sp>
-      </p:grpSp>
-      <p:grpSp>
-        <p:nvGrpSpPr>
           <p:cNvPr id="151" name="Groupe 150">
             <a:extLst>
               <a:ext uri="{FF2B5EF4-FFF2-40B4-BE49-F238E27FC236}">
@@ -19363,10 +19429,10 @@
             <p:nvPr/>
           </p:nvPicPr>
           <p:blipFill>
-            <a:blip r:embed="rId5">
+            <a:blip r:embed="rId2">
               <a:extLst>
                 <a:ext uri="{96DAC541-7B7A-43D3-8B79-37D633B846F1}">
-                  <asvg:svgBlip xmlns:asvg="http://schemas.microsoft.com/office/drawing/2016/SVG/main" r:embed="rId7"/>
+                  <asvg:svgBlip xmlns:asvg="http://schemas.microsoft.com/office/drawing/2016/SVG/main" r:embed="rId3"/>
                 </a:ext>
               </a:extLst>
             </a:blip>
@@ -19461,10 +19527,10 @@
             <p:nvPr/>
           </p:nvPicPr>
           <p:blipFill>
-            <a:blip r:embed="rId5">
+            <a:blip r:embed="rId2">
               <a:extLst>
                 <a:ext uri="{96DAC541-7B7A-43D3-8B79-37D633B846F1}">
-                  <asvg:svgBlip xmlns:asvg="http://schemas.microsoft.com/office/drawing/2016/SVG/main" r:embed="rId7"/>
+                  <asvg:svgBlip xmlns:asvg="http://schemas.microsoft.com/office/drawing/2016/SVG/main" r:embed="rId3"/>
                 </a:ext>
               </a:extLst>
             </a:blip>
@@ -19559,10 +19625,10 @@
             <p:nvPr/>
           </p:nvPicPr>
           <p:blipFill>
-            <a:blip r:embed="rId5">
+            <a:blip r:embed="rId2">
               <a:extLst>
                 <a:ext uri="{96DAC541-7B7A-43D3-8B79-37D633B846F1}">
-                  <asvg:svgBlip xmlns:asvg="http://schemas.microsoft.com/office/drawing/2016/SVG/main" r:embed="rId7"/>
+                  <asvg:svgBlip xmlns:asvg="http://schemas.microsoft.com/office/drawing/2016/SVG/main" r:embed="rId3"/>
                 </a:ext>
               </a:extLst>
             </a:blip>
@@ -19664,10 +19730,10 @@
             <p:nvPr/>
           </p:nvPicPr>
           <p:blipFill>
-            <a:blip r:embed="rId5">
+            <a:blip r:embed="rId2">
               <a:extLst>
                 <a:ext uri="{96DAC541-7B7A-43D3-8B79-37D633B846F1}">
-                  <asvg:svgBlip xmlns:asvg="http://schemas.microsoft.com/office/drawing/2016/SVG/main" r:embed="rId7"/>
+                  <asvg:svgBlip xmlns:asvg="http://schemas.microsoft.com/office/drawing/2016/SVG/main" r:embed="rId3"/>
                 </a:ext>
               </a:extLst>
             </a:blip>
@@ -20621,7 +20687,7 @@
             <a:p>
               <a:r>
                 <a:rPr lang="fr-FR" sz="1400" dirty="0"/>
-                <a:t>- For </a:t>
+                <a:t>For </a:t>
               </a:r>
               <a:r>
                 <a:rPr lang="fr-FR" sz="1400" dirty="0" err="1"/>
@@ -20629,7 +20695,7 @@
               </a:r>
               <a:r>
                 <a:rPr lang="fr-FR" sz="1400" dirty="0"/>
-                <a:t> fil</a:t>
+                <a:t> image</a:t>
               </a:r>
             </a:p>
           </p:txBody>
@@ -20649,7 +20715,7 @@
             <p:nvPr/>
           </p:nvPicPr>
           <p:blipFill>
-            <a:blip r:embed="rId2"/>
+            <a:blip r:embed="rId4"/>
             <a:stretch>
               <a:fillRect/>
             </a:stretch>
@@ -20700,10 +20766,10 @@
             <p:nvPr/>
           </p:nvPicPr>
           <p:blipFill>
-            <a:blip r:embed="rId5">
+            <a:blip r:embed="rId2">
               <a:extLst>
                 <a:ext uri="{96DAC541-7B7A-43D3-8B79-37D633B846F1}">
-                  <asvg:svgBlip xmlns:asvg="http://schemas.microsoft.com/office/drawing/2016/SVG/main" r:embed="rId7"/>
+                  <asvg:svgBlip xmlns:asvg="http://schemas.microsoft.com/office/drawing/2016/SVG/main" r:embed="rId3"/>
                 </a:ext>
               </a:extLst>
             </a:blip>
@@ -20914,7 +20980,7 @@
             <p:nvPr/>
           </p:nvPicPr>
           <p:blipFill>
-            <a:blip r:embed="rId2"/>
+            <a:blip r:embed="rId4"/>
             <a:stretch>
               <a:fillRect/>
             </a:stretch>
@@ -21559,6 +21625,555 @@
           <a:p>
             <a:pPr algn="ctr"/>
             <a:endParaRPr lang="fr-FR" dirty="0"/>
+          </a:p>
+        </p:txBody>
+      </p:sp>
+      <p:sp>
+        <p:nvSpPr>
+          <p:cNvPr id="24" name="Ellipse 23">
+            <a:extLst>
+              <a:ext uri="{FF2B5EF4-FFF2-40B4-BE49-F238E27FC236}">
+                <a16:creationId xmlns:a16="http://schemas.microsoft.com/office/drawing/2014/main" id="{F99FA572-186B-FA77-F2ED-018AC433C235}"/>
+              </a:ext>
+            </a:extLst>
+          </p:cNvPr>
+          <p:cNvSpPr/>
+          <p:nvPr/>
+        </p:nvSpPr>
+        <p:spPr>
+          <a:xfrm>
+            <a:off x="3293555" y="2364648"/>
+            <a:ext cx="341836" cy="332275"/>
+          </a:xfrm>
+          <a:prstGeom prst="ellipse">
+            <a:avLst/>
+          </a:prstGeom>
+        </p:spPr>
+        <p:style>
+          <a:lnRef idx="2">
+            <a:schemeClr val="accent1">
+              <a:shade val="15000"/>
+            </a:schemeClr>
+          </a:lnRef>
+          <a:fillRef idx="1">
+            <a:schemeClr val="accent1"/>
+          </a:fillRef>
+          <a:effectRef idx="0">
+            <a:schemeClr val="accent1"/>
+          </a:effectRef>
+          <a:fontRef idx="minor">
+            <a:schemeClr val="lt1"/>
+          </a:fontRef>
+        </p:style>
+        <p:txBody>
+          <a:bodyPr rtlCol="0" anchor="ctr"/>
+          <a:lstStyle/>
+          <a:p>
+            <a:pPr algn="ctr"/>
+            <a:r>
+              <a:rPr lang="fr-FR" dirty="0">
+                <a:ln w="0"/>
+                <a:solidFill>
+                  <a:schemeClr val="tx1"/>
+                </a:solidFill>
+                <a:effectLst>
+                  <a:outerShdw blurRad="38100" dist="19050" dir="2700000" algn="tl" rotWithShape="0">
+                    <a:schemeClr val="dk1">
+                      <a:alpha val="40000"/>
+                    </a:schemeClr>
+                  </a:outerShdw>
+                </a:effectLst>
+              </a:rPr>
+              <a:t>1</a:t>
+            </a:r>
+          </a:p>
+        </p:txBody>
+      </p:sp>
+      <p:sp>
+        <p:nvSpPr>
+          <p:cNvPr id="26" name="Ellipse 25">
+            <a:extLst>
+              <a:ext uri="{FF2B5EF4-FFF2-40B4-BE49-F238E27FC236}">
+                <a16:creationId xmlns:a16="http://schemas.microsoft.com/office/drawing/2014/main" id="{21A6E193-C5B5-C06E-2824-14FFC6D43E27}"/>
+              </a:ext>
+            </a:extLst>
+          </p:cNvPr>
+          <p:cNvSpPr/>
+          <p:nvPr/>
+        </p:nvSpPr>
+        <p:spPr>
+          <a:xfrm>
+            <a:off x="4543584" y="2313399"/>
+            <a:ext cx="341836" cy="332275"/>
+          </a:xfrm>
+          <a:prstGeom prst="ellipse">
+            <a:avLst/>
+          </a:prstGeom>
+        </p:spPr>
+        <p:style>
+          <a:lnRef idx="2">
+            <a:schemeClr val="accent1">
+              <a:shade val="15000"/>
+            </a:schemeClr>
+          </a:lnRef>
+          <a:fillRef idx="1">
+            <a:schemeClr val="accent1"/>
+          </a:fillRef>
+          <a:effectRef idx="0">
+            <a:schemeClr val="accent1"/>
+          </a:effectRef>
+          <a:fontRef idx="minor">
+            <a:schemeClr val="lt1"/>
+          </a:fontRef>
+        </p:style>
+        <p:txBody>
+          <a:bodyPr rtlCol="0" anchor="ctr"/>
+          <a:lstStyle/>
+          <a:p>
+            <a:pPr algn="ctr"/>
+            <a:r>
+              <a:rPr lang="fr-FR" dirty="0">
+                <a:ln w="0"/>
+                <a:solidFill>
+                  <a:schemeClr val="tx1"/>
+                </a:solidFill>
+                <a:effectLst>
+                  <a:outerShdw blurRad="38100" dist="19050" dir="2700000" algn="tl" rotWithShape="0">
+                    <a:schemeClr val="dk1">
+                      <a:alpha val="40000"/>
+                    </a:schemeClr>
+                  </a:outerShdw>
+                </a:effectLst>
+              </a:rPr>
+              <a:t>2</a:t>
+            </a:r>
+          </a:p>
+        </p:txBody>
+      </p:sp>
+      <p:sp>
+        <p:nvSpPr>
+          <p:cNvPr id="28" name="Ellipse 27">
+            <a:extLst>
+              <a:ext uri="{FF2B5EF4-FFF2-40B4-BE49-F238E27FC236}">
+                <a16:creationId xmlns:a16="http://schemas.microsoft.com/office/drawing/2014/main" id="{884B7D66-BD57-F3C9-812C-607947AEA05D}"/>
+              </a:ext>
+            </a:extLst>
+          </p:cNvPr>
+          <p:cNvSpPr/>
+          <p:nvPr/>
+        </p:nvSpPr>
+        <p:spPr>
+          <a:xfrm>
+            <a:off x="10271922" y="2344476"/>
+            <a:ext cx="341836" cy="332275"/>
+          </a:xfrm>
+          <a:prstGeom prst="ellipse">
+            <a:avLst/>
+          </a:prstGeom>
+        </p:spPr>
+        <p:style>
+          <a:lnRef idx="2">
+            <a:schemeClr val="accent1">
+              <a:shade val="15000"/>
+            </a:schemeClr>
+          </a:lnRef>
+          <a:fillRef idx="1">
+            <a:schemeClr val="accent1"/>
+          </a:fillRef>
+          <a:effectRef idx="0">
+            <a:schemeClr val="accent1"/>
+          </a:effectRef>
+          <a:fontRef idx="minor">
+            <a:schemeClr val="lt1"/>
+          </a:fontRef>
+        </p:style>
+        <p:txBody>
+          <a:bodyPr rtlCol="0" anchor="ctr"/>
+          <a:lstStyle/>
+          <a:p>
+            <a:pPr algn="ctr"/>
+            <a:r>
+              <a:rPr lang="fr-FR" dirty="0">
+                <a:ln w="0"/>
+                <a:solidFill>
+                  <a:schemeClr val="tx1"/>
+                </a:solidFill>
+                <a:effectLst>
+                  <a:outerShdw blurRad="38100" dist="19050" dir="2700000" algn="tl" rotWithShape="0">
+                    <a:schemeClr val="dk1">
+                      <a:alpha val="40000"/>
+                    </a:schemeClr>
+                  </a:outerShdw>
+                </a:effectLst>
+              </a:rPr>
+              <a:t>3</a:t>
+            </a:r>
+          </a:p>
+        </p:txBody>
+      </p:sp>
+      <p:sp>
+        <p:nvSpPr>
+          <p:cNvPr id="30" name="Ellipse 29">
+            <a:extLst>
+              <a:ext uri="{FF2B5EF4-FFF2-40B4-BE49-F238E27FC236}">
+                <a16:creationId xmlns:a16="http://schemas.microsoft.com/office/drawing/2014/main" id="{22200009-3815-FA76-8E57-A37DE6A6FA9C}"/>
+              </a:ext>
+            </a:extLst>
+          </p:cNvPr>
+          <p:cNvSpPr/>
+          <p:nvPr/>
+        </p:nvSpPr>
+        <p:spPr>
+          <a:xfrm>
+            <a:off x="4458407" y="1151010"/>
+            <a:ext cx="1518187" cy="332275"/>
+          </a:xfrm>
+          <a:prstGeom prst="ellipse">
+            <a:avLst/>
+          </a:prstGeom>
+        </p:spPr>
+        <p:style>
+          <a:lnRef idx="2">
+            <a:schemeClr val="accent1">
+              <a:shade val="15000"/>
+            </a:schemeClr>
+          </a:lnRef>
+          <a:fillRef idx="1">
+            <a:schemeClr val="accent1"/>
+          </a:fillRef>
+          <a:effectRef idx="0">
+            <a:schemeClr val="accent1"/>
+          </a:effectRef>
+          <a:fontRef idx="minor">
+            <a:schemeClr val="lt1"/>
+          </a:fontRef>
+        </p:style>
+        <p:txBody>
+          <a:bodyPr rtlCol="0" anchor="ctr"/>
+          <a:lstStyle/>
+          <a:p>
+            <a:pPr algn="ctr"/>
+            <a:r>
+              <a:rPr lang="fr-FR" dirty="0">
+                <a:ln w="0"/>
+                <a:solidFill>
+                  <a:schemeClr val="tx1"/>
+                </a:solidFill>
+                <a:effectLst>
+                  <a:outerShdw blurRad="38100" dist="19050" dir="2700000" algn="tl" rotWithShape="0">
+                    <a:schemeClr val="dk1">
+                      <a:alpha val="40000"/>
+                    </a:schemeClr>
+                  </a:outerShdw>
+                </a:effectLst>
+              </a:rPr>
+              <a:t>3 étapes</a:t>
+            </a:r>
+          </a:p>
+        </p:txBody>
+      </p:sp>
+      <p:sp>
+        <p:nvSpPr>
+          <p:cNvPr id="31" name="Ellipse 30">
+            <a:extLst>
+              <a:ext uri="{FF2B5EF4-FFF2-40B4-BE49-F238E27FC236}">
+                <a16:creationId xmlns:a16="http://schemas.microsoft.com/office/drawing/2014/main" id="{487C1595-6D32-92FD-DC15-EC88AC127210}"/>
+              </a:ext>
+            </a:extLst>
+          </p:cNvPr>
+          <p:cNvSpPr/>
+          <p:nvPr/>
+        </p:nvSpPr>
+        <p:spPr>
+          <a:xfrm>
+            <a:off x="1691116" y="3043328"/>
+            <a:ext cx="600178" cy="189974"/>
+          </a:xfrm>
+          <a:prstGeom prst="ellipse">
+            <a:avLst/>
+          </a:prstGeom>
+        </p:spPr>
+        <p:style>
+          <a:lnRef idx="2">
+            <a:schemeClr val="accent1">
+              <a:shade val="15000"/>
+            </a:schemeClr>
+          </a:lnRef>
+          <a:fillRef idx="1">
+            <a:schemeClr val="accent1"/>
+          </a:fillRef>
+          <a:effectRef idx="0">
+            <a:schemeClr val="accent1"/>
+          </a:effectRef>
+          <a:fontRef idx="minor">
+            <a:schemeClr val="lt1"/>
+          </a:fontRef>
+        </p:style>
+        <p:txBody>
+          <a:bodyPr rtlCol="0" anchor="ctr"/>
+          <a:lstStyle/>
+          <a:p>
+            <a:pPr algn="ctr"/>
+            <a:r>
+              <a:rPr lang="fr-FR" sz="1200" dirty="0">
+                <a:ln w="0"/>
+                <a:solidFill>
+                  <a:schemeClr val="tx1"/>
+                </a:solidFill>
+                <a:effectLst>
+                  <a:outerShdw blurRad="38100" dist="19050" dir="2700000" algn="tl" rotWithShape="0">
+                    <a:schemeClr val="dk1">
+                      <a:alpha val="40000"/>
+                    </a:schemeClr>
+                  </a:outerShdw>
+                </a:effectLst>
+              </a:rPr>
+              <a:t>1.1</a:t>
+            </a:r>
+          </a:p>
+        </p:txBody>
+      </p:sp>
+      <p:sp>
+        <p:nvSpPr>
+          <p:cNvPr id="33" name="Ellipse 32">
+            <a:extLst>
+              <a:ext uri="{FF2B5EF4-FFF2-40B4-BE49-F238E27FC236}">
+                <a16:creationId xmlns:a16="http://schemas.microsoft.com/office/drawing/2014/main" id="{884C4BD4-207F-39E4-823F-373FD53AEFD7}"/>
+              </a:ext>
+            </a:extLst>
+          </p:cNvPr>
+          <p:cNvSpPr/>
+          <p:nvPr/>
+        </p:nvSpPr>
+        <p:spPr>
+          <a:xfrm>
+            <a:off x="2955930" y="3053432"/>
+            <a:ext cx="600178" cy="189974"/>
+          </a:xfrm>
+          <a:prstGeom prst="ellipse">
+            <a:avLst/>
+          </a:prstGeom>
+        </p:spPr>
+        <p:style>
+          <a:lnRef idx="2">
+            <a:schemeClr val="accent1">
+              <a:shade val="15000"/>
+            </a:schemeClr>
+          </a:lnRef>
+          <a:fillRef idx="1">
+            <a:schemeClr val="accent1"/>
+          </a:fillRef>
+          <a:effectRef idx="0">
+            <a:schemeClr val="accent1"/>
+          </a:effectRef>
+          <a:fontRef idx="minor">
+            <a:schemeClr val="lt1"/>
+          </a:fontRef>
+        </p:style>
+        <p:txBody>
+          <a:bodyPr rtlCol="0" anchor="ctr"/>
+          <a:lstStyle/>
+          <a:p>
+            <a:pPr algn="ctr"/>
+            <a:r>
+              <a:rPr lang="fr-FR" sz="1200" dirty="0">
+                <a:ln w="0"/>
+                <a:solidFill>
+                  <a:schemeClr val="tx1"/>
+                </a:solidFill>
+                <a:effectLst>
+                  <a:outerShdw blurRad="38100" dist="19050" dir="2700000" algn="tl" rotWithShape="0">
+                    <a:schemeClr val="dk1">
+                      <a:alpha val="40000"/>
+                    </a:schemeClr>
+                  </a:outerShdw>
+                </a:effectLst>
+              </a:rPr>
+              <a:t>1.2</a:t>
+            </a:r>
+          </a:p>
+        </p:txBody>
+      </p:sp>
+      <p:sp>
+        <p:nvSpPr>
+          <p:cNvPr id="34" name="Ellipse 33">
+            <a:extLst>
+              <a:ext uri="{FF2B5EF4-FFF2-40B4-BE49-F238E27FC236}">
+                <a16:creationId xmlns:a16="http://schemas.microsoft.com/office/drawing/2014/main" id="{3A16DBE0-B603-F81E-2381-33FF39D44B03}"/>
+              </a:ext>
+            </a:extLst>
+          </p:cNvPr>
+          <p:cNvSpPr/>
+          <p:nvPr/>
+        </p:nvSpPr>
+        <p:spPr>
+          <a:xfrm>
+            <a:off x="5424828" y="3043328"/>
+            <a:ext cx="600178" cy="189974"/>
+          </a:xfrm>
+          <a:prstGeom prst="ellipse">
+            <a:avLst/>
+          </a:prstGeom>
+        </p:spPr>
+        <p:style>
+          <a:lnRef idx="2">
+            <a:schemeClr val="accent1">
+              <a:shade val="15000"/>
+            </a:schemeClr>
+          </a:lnRef>
+          <a:fillRef idx="1">
+            <a:schemeClr val="accent1"/>
+          </a:fillRef>
+          <a:effectRef idx="0">
+            <a:schemeClr val="accent1"/>
+          </a:effectRef>
+          <a:fontRef idx="minor">
+            <a:schemeClr val="lt1"/>
+          </a:fontRef>
+        </p:style>
+        <p:txBody>
+          <a:bodyPr rtlCol="0" anchor="ctr"/>
+          <a:lstStyle/>
+          <a:p>
+            <a:pPr algn="ctr"/>
+            <a:r>
+              <a:rPr lang="fr-FR" sz="1200" dirty="0">
+                <a:ln w="0"/>
+                <a:solidFill>
+                  <a:schemeClr val="tx1"/>
+                </a:solidFill>
+                <a:effectLst>
+                  <a:outerShdw blurRad="38100" dist="19050" dir="2700000" algn="tl" rotWithShape="0">
+                    <a:schemeClr val="dk1">
+                      <a:alpha val="40000"/>
+                    </a:schemeClr>
+                  </a:outerShdw>
+                </a:effectLst>
+              </a:rPr>
+              <a:t>1.3</a:t>
+            </a:r>
+          </a:p>
+        </p:txBody>
+      </p:sp>
+      <p:sp>
+        <p:nvSpPr>
+          <p:cNvPr id="35" name="Ellipse 34">
+            <a:extLst>
+              <a:ext uri="{FF2B5EF4-FFF2-40B4-BE49-F238E27FC236}">
+                <a16:creationId xmlns:a16="http://schemas.microsoft.com/office/drawing/2014/main" id="{2B2AE4AE-5C22-98F7-96C4-5C075517CCD5}"/>
+              </a:ext>
+            </a:extLst>
+          </p:cNvPr>
+          <p:cNvSpPr/>
+          <p:nvPr/>
+        </p:nvSpPr>
+        <p:spPr>
+          <a:xfrm>
+            <a:off x="7972190" y="3632895"/>
+            <a:ext cx="600178" cy="189974"/>
+          </a:xfrm>
+          <a:prstGeom prst="ellipse">
+            <a:avLst/>
+          </a:prstGeom>
+        </p:spPr>
+        <p:style>
+          <a:lnRef idx="2">
+            <a:schemeClr val="accent1">
+              <a:shade val="15000"/>
+            </a:schemeClr>
+          </a:lnRef>
+          <a:fillRef idx="1">
+            <a:schemeClr val="accent1"/>
+          </a:fillRef>
+          <a:effectRef idx="0">
+            <a:schemeClr val="accent1"/>
+          </a:effectRef>
+          <a:fontRef idx="minor">
+            <a:schemeClr val="lt1"/>
+          </a:fontRef>
+        </p:style>
+        <p:txBody>
+          <a:bodyPr rtlCol="0" anchor="ctr"/>
+          <a:lstStyle/>
+          <a:p>
+            <a:pPr algn="ctr"/>
+            <a:r>
+              <a:rPr lang="fr-FR" sz="1200" dirty="0">
+                <a:ln w="0"/>
+                <a:solidFill>
+                  <a:schemeClr val="tx1"/>
+                </a:solidFill>
+                <a:effectLst>
+                  <a:outerShdw blurRad="38100" dist="19050" dir="2700000" algn="tl" rotWithShape="0">
+                    <a:schemeClr val="dk1">
+                      <a:alpha val="40000"/>
+                    </a:schemeClr>
+                  </a:outerShdw>
+                </a:effectLst>
+              </a:rPr>
+              <a:t>1.4</a:t>
+            </a:r>
+          </a:p>
+        </p:txBody>
+      </p:sp>
+      <p:sp>
+        <p:nvSpPr>
+          <p:cNvPr id="36" name="Ellipse 35">
+            <a:extLst>
+              <a:ext uri="{FF2B5EF4-FFF2-40B4-BE49-F238E27FC236}">
+                <a16:creationId xmlns:a16="http://schemas.microsoft.com/office/drawing/2014/main" id="{843DBB18-9F21-4168-F021-EE2E7431C48D}"/>
+              </a:ext>
+            </a:extLst>
+          </p:cNvPr>
+          <p:cNvSpPr/>
+          <p:nvPr/>
+        </p:nvSpPr>
+        <p:spPr>
+          <a:xfrm>
+            <a:off x="9405833" y="4731817"/>
+            <a:ext cx="600178" cy="189974"/>
+          </a:xfrm>
+          <a:prstGeom prst="ellipse">
+            <a:avLst/>
+          </a:prstGeom>
+        </p:spPr>
+        <p:style>
+          <a:lnRef idx="2">
+            <a:schemeClr val="accent1">
+              <a:shade val="15000"/>
+            </a:schemeClr>
+          </a:lnRef>
+          <a:fillRef idx="1">
+            <a:schemeClr val="accent1"/>
+          </a:fillRef>
+          <a:effectRef idx="0">
+            <a:schemeClr val="accent1"/>
+          </a:effectRef>
+          <a:fontRef idx="minor">
+            <a:schemeClr val="lt1"/>
+          </a:fontRef>
+        </p:style>
+        <p:txBody>
+          <a:bodyPr rtlCol="0" anchor="ctr"/>
+          <a:lstStyle/>
+          <a:p>
+            <a:pPr algn="ctr"/>
+            <a:r>
+              <a:rPr lang="fr-FR" sz="1200" dirty="0">
+                <a:ln w="0"/>
+                <a:solidFill>
+                  <a:schemeClr val="tx1"/>
+                </a:solidFill>
+                <a:effectLst>
+                  <a:outerShdw blurRad="38100" dist="19050" dir="2700000" algn="tl" rotWithShape="0">
+                    <a:schemeClr val="dk1">
+                      <a:alpha val="40000"/>
+                    </a:schemeClr>
+                  </a:outerShdw>
+                </a:effectLst>
+              </a:rPr>
+              <a:t>1.5</a:t>
+            </a:r>
           </a:p>
         </p:txBody>
       </p:sp>
@@ -21835,26 +22450,35 @@
                                   </p:childTnLst>
                                 </p:cTn>
                               </p:par>
-                            </p:childTnLst>
-                          </p:cTn>
-                        </p:par>
-                      </p:childTnLst>
-                    </p:cTn>
-                  </p:par>
-                  <p:par>
-                    <p:cTn id="25" fill="hold">
-                      <p:stCondLst>
-                        <p:cond delay="indefinite"/>
-                      </p:stCondLst>
-                      <p:childTnLst>
-                        <p:par>
-                          <p:cTn id="26" fill="hold">
-                            <p:stCondLst>
-                              <p:cond delay="0"/>
-                            </p:stCondLst>
-                            <p:childTnLst>
                               <p:par>
-                                <p:cTn id="27" presetID="1" presetClass="entr" presetSubtype="0" fill="hold" nodeType="clickEffect">
+                                <p:cTn id="25" presetID="1" presetClass="entr" presetSubtype="0" fill="hold" grpId="0" nodeType="withEffect">
+                                  <p:stCondLst>
+                                    <p:cond delay="0"/>
+                                  </p:stCondLst>
+                                  <p:childTnLst>
+                                    <p:set>
+                                      <p:cBhvr>
+                                        <p:cTn id="26" dur="1" fill="hold">
+                                          <p:stCondLst>
+                                            <p:cond delay="0"/>
+                                          </p:stCondLst>
+                                        </p:cTn>
+                                        <p:tgtEl>
+                                          <p:spTgt spid="24"/>
+                                        </p:tgtEl>
+                                        <p:attrNameLst>
+                                          <p:attrName>style.visibility</p:attrName>
+                                        </p:attrNameLst>
+                                      </p:cBhvr>
+                                      <p:to>
+                                        <p:strVal val="visible"/>
+                                      </p:to>
+                                    </p:set>
+                                  </p:childTnLst>
+                                </p:cTn>
+                              </p:par>
+                              <p:par>
+                                <p:cTn id="27" presetID="1" presetClass="entr" presetSubtype="0" fill="hold" grpId="0" nodeType="withEffect">
                                   <p:stCondLst>
                                     <p:cond delay="0"/>
                                   </p:stCondLst>
@@ -21867,7 +22491,7 @@
                                           </p:stCondLst>
                                         </p:cTn>
                                         <p:tgtEl>
-                                          <p:spTgt spid="56"/>
+                                          <p:spTgt spid="30"/>
                                         </p:tgtEl>
                                         <p:attrNameLst>
                                           <p:attrName>style.visibility</p:attrName>
@@ -21912,7 +22536,7 @@
                                           </p:stCondLst>
                                         </p:cTn>
                                         <p:tgtEl>
-                                          <p:spTgt spid="3"/>
+                                          <p:spTgt spid="56"/>
                                         </p:tgtEl>
                                         <p:attrNameLst>
                                           <p:attrName>style.visibility</p:attrName>
@@ -21926,7 +22550,7 @@
                                 </p:cTn>
                               </p:par>
                               <p:par>
-                                <p:cTn id="33" presetID="1" presetClass="entr" presetSubtype="0" fill="hold" nodeType="withEffect">
+                                <p:cTn id="33" presetID="1" presetClass="entr" presetSubtype="0" fill="hold" grpId="0" nodeType="withEffect">
                                   <p:stCondLst>
                                     <p:cond delay="0"/>
                                   </p:stCondLst>
@@ -21939,7 +22563,7 @@
                                           </p:stCondLst>
                                         </p:cTn>
                                         <p:tgtEl>
-                                          <p:spTgt spid="10"/>
+                                          <p:spTgt spid="31"/>
                                         </p:tgtEl>
                                         <p:attrNameLst>
                                           <p:attrName>style.visibility</p:attrName>
@@ -21952,35 +22576,26 @@
                                   </p:childTnLst>
                                 </p:cTn>
                               </p:par>
+                            </p:childTnLst>
+                          </p:cTn>
+                        </p:par>
+                      </p:childTnLst>
+                    </p:cTn>
+                  </p:par>
+                  <p:par>
+                    <p:cTn id="35" fill="hold">
+                      <p:stCondLst>
+                        <p:cond delay="indefinite"/>
+                      </p:stCondLst>
+                      <p:childTnLst>
+                        <p:par>
+                          <p:cTn id="36" fill="hold">
+                            <p:stCondLst>
+                              <p:cond delay="0"/>
+                            </p:stCondLst>
+                            <p:childTnLst>
                               <p:par>
-                                <p:cTn id="35" presetID="1" presetClass="entr" presetSubtype="0" fill="hold" grpId="0" nodeType="withEffect">
-                                  <p:stCondLst>
-                                    <p:cond delay="0"/>
-                                  </p:stCondLst>
-                                  <p:childTnLst>
-                                    <p:set>
-                                      <p:cBhvr>
-                                        <p:cTn id="36" dur="1" fill="hold">
-                                          <p:stCondLst>
-                                            <p:cond delay="0"/>
-                                          </p:stCondLst>
-                                        </p:cTn>
-                                        <p:tgtEl>
-                                          <p:spTgt spid="18"/>
-                                        </p:tgtEl>
-                                        <p:attrNameLst>
-                                          <p:attrName>style.visibility</p:attrName>
-                                        </p:attrNameLst>
-                                      </p:cBhvr>
-                                      <p:to>
-                                        <p:strVal val="visible"/>
-                                      </p:to>
-                                    </p:set>
-                                  </p:childTnLst>
-                                </p:cTn>
-                              </p:par>
-                              <p:par>
-                                <p:cTn id="37" presetID="1" presetClass="entr" presetSubtype="0" fill="hold" grpId="0" nodeType="withEffect">
+                                <p:cTn id="37" presetID="1" presetClass="entr" presetSubtype="0" fill="hold" nodeType="clickEffect">
                                   <p:stCondLst>
                                     <p:cond delay="0"/>
                                   </p:stCondLst>
@@ -21993,7 +22608,7 @@
                                           </p:stCondLst>
                                         </p:cTn>
                                         <p:tgtEl>
-                                          <p:spTgt spid="19"/>
+                                          <p:spTgt spid="3"/>
                                         </p:tgtEl>
                                         <p:attrNameLst>
                                           <p:attrName>style.visibility</p:attrName>
@@ -22020,6 +22635,87 @@
                                           </p:stCondLst>
                                         </p:cTn>
                                         <p:tgtEl>
+                                          <p:spTgt spid="10"/>
+                                        </p:tgtEl>
+                                        <p:attrNameLst>
+                                          <p:attrName>style.visibility</p:attrName>
+                                        </p:attrNameLst>
+                                      </p:cBhvr>
+                                      <p:to>
+                                        <p:strVal val="visible"/>
+                                      </p:to>
+                                    </p:set>
+                                  </p:childTnLst>
+                                </p:cTn>
+                              </p:par>
+                              <p:par>
+                                <p:cTn id="41" presetID="1" presetClass="entr" presetSubtype="0" fill="hold" grpId="0" nodeType="withEffect">
+                                  <p:stCondLst>
+                                    <p:cond delay="0"/>
+                                  </p:stCondLst>
+                                  <p:childTnLst>
+                                    <p:set>
+                                      <p:cBhvr>
+                                        <p:cTn id="42" dur="1" fill="hold">
+                                          <p:stCondLst>
+                                            <p:cond delay="0"/>
+                                          </p:stCondLst>
+                                        </p:cTn>
+                                        <p:tgtEl>
+                                          <p:spTgt spid="18"/>
+                                        </p:tgtEl>
+                                        <p:attrNameLst>
+                                          <p:attrName>style.visibility</p:attrName>
+                                        </p:attrNameLst>
+                                      </p:cBhvr>
+                                      <p:to>
+                                        <p:strVal val="visible"/>
+                                      </p:to>
+                                    </p:set>
+                                  </p:childTnLst>
+                                </p:cTn>
+                              </p:par>
+                              <p:par>
+                                <p:cTn id="43" presetID="1" presetClass="entr" presetSubtype="0" fill="hold" grpId="0" nodeType="withEffect">
+                                  <p:stCondLst>
+                                    <p:cond delay="0"/>
+                                  </p:stCondLst>
+                                  <p:childTnLst>
+                                    <p:set>
+                                      <p:cBhvr>
+                                        <p:cTn id="44" dur="1" fill="hold">
+                                          <p:stCondLst>
+                                            <p:cond delay="0"/>
+                                          </p:stCondLst>
+                                        </p:cTn>
+                                        <p:tgtEl>
+                                          <p:spTgt spid="19"/>
+                                        </p:tgtEl>
+                                        <p:attrNameLst>
+                                          <p:attrName>style.visibility</p:attrName>
+                                        </p:attrNameLst>
+                                      </p:cBhvr>
+                                      <p:to>
+                                        <p:strVal val="visible"/>
+                                      </p:to>
+                                    </p:set>
+                                  </p:childTnLst>
+                                </p:cTn>
+                              </p:par>
+                              <p:par>
+                                <p:cTn id="45" presetID="1" presetClass="entr" presetSubtype="0" fill="hold" nodeType="withEffect">
+                                  <p:stCondLst>
+                                    <p:cond delay="0"/>
+                                  </p:stCondLst>
+                                  <p:childTnLst>
+                                    <p:set>
+                                      <p:cBhvr>
+                                        <p:cTn id="46" dur="1" fill="hold">
+                                          <p:stCondLst>
+                                            <p:cond delay="0"/>
+                                          </p:stCondLst>
+                                        </p:cTn>
+                                        <p:tgtEl>
                                           <p:spTgt spid="141"/>
                                         </p:tgtEl>
                                         <p:attrNameLst>
@@ -22040,32 +22736,59 @@
                     </p:cTn>
                   </p:par>
                   <p:par>
-                    <p:cTn id="41" fill="hold">
+                    <p:cTn id="47" fill="hold">
                       <p:stCondLst>
                         <p:cond delay="indefinite"/>
                       </p:stCondLst>
                       <p:childTnLst>
                         <p:par>
-                          <p:cTn id="42" fill="hold">
+                          <p:cTn id="48" fill="hold">
                             <p:stCondLst>
                               <p:cond delay="0"/>
                             </p:stCondLst>
                             <p:childTnLst>
                               <p:par>
-                                <p:cTn id="43" presetID="1" presetClass="entr" presetSubtype="0" fill="hold" nodeType="clickEffect">
+                                <p:cTn id="49" presetID="1" presetClass="entr" presetSubtype="0" fill="hold" nodeType="clickEffect">
                                   <p:stCondLst>
                                     <p:cond delay="0"/>
                                   </p:stCondLst>
                                   <p:childTnLst>
                                     <p:set>
                                       <p:cBhvr>
-                                        <p:cTn id="44" dur="1" fill="hold">
+                                        <p:cTn id="50" dur="1" fill="hold">
                                           <p:stCondLst>
                                             <p:cond delay="0"/>
                                           </p:stCondLst>
                                         </p:cTn>
                                         <p:tgtEl>
                                           <p:spTgt spid="55"/>
+                                        </p:tgtEl>
+                                        <p:attrNameLst>
+                                          <p:attrName>style.visibility</p:attrName>
+                                        </p:attrNameLst>
+                                      </p:cBhvr>
+                                      <p:to>
+                                        <p:strVal val="visible"/>
+                                      </p:to>
+                                    </p:set>
+                                  </p:childTnLst>
+                                </p:cTn>
+                              </p:par>
+                              <p:par>
+                                <p:cTn id="51" presetID="1" presetClass="entr" presetSubtype="0" fill="hold" grpId="0" nodeType="withEffect">
+                                  <p:stCondLst>
+                                    <p:cond delay="0"/>
+                                  </p:stCondLst>
+                                  <p:childTnLst>
+                                    <p:set>
+                                      <p:cBhvr>
+                                        <p:cTn id="52" dur="1" fill="hold">
+                                          <p:stCondLst>
+                                            <p:cond delay="0"/>
+                                          </p:stCondLst>
+                                        </p:cTn>
+                                        <p:tgtEl>
+                                          <p:spTgt spid="33"/>
                                         </p:tgtEl>
                                         <p:attrNameLst>
                                           <p:attrName>style.visibility</p:attrName>
@@ -22085,26 +22808,26 @@
                     </p:cTn>
                   </p:par>
                   <p:par>
-                    <p:cTn id="45" fill="hold">
+                    <p:cTn id="53" fill="hold">
                       <p:stCondLst>
                         <p:cond delay="indefinite"/>
                       </p:stCondLst>
                       <p:childTnLst>
                         <p:par>
-                          <p:cTn id="46" fill="hold">
+                          <p:cTn id="54" fill="hold">
                             <p:stCondLst>
                               <p:cond delay="0"/>
                             </p:stCondLst>
                             <p:childTnLst>
                               <p:par>
-                                <p:cTn id="47" presetID="1" presetClass="entr" presetSubtype="0" fill="hold" nodeType="clickEffect">
+                                <p:cTn id="55" presetID="1" presetClass="entr" presetSubtype="0" fill="hold" nodeType="clickEffect">
                                   <p:stCondLst>
                                     <p:cond delay="0"/>
                                   </p:stCondLst>
                                   <p:childTnLst>
                                     <p:set>
                                       <p:cBhvr>
-                                        <p:cTn id="48" dur="1" fill="hold">
+                                        <p:cTn id="56" dur="1" fill="hold">
                                           <p:stCondLst>
                                             <p:cond delay="0"/>
                                           </p:stCondLst>
@@ -22124,97 +22847,7 @@
                                 </p:cTn>
                               </p:par>
                               <p:par>
-                                <p:cTn id="49" presetID="1" presetClass="entr" presetSubtype="0" fill="hold" nodeType="withEffect">
-                                  <p:stCondLst>
-                                    <p:cond delay="0"/>
-                                  </p:stCondLst>
-                                  <p:childTnLst>
-                                    <p:set>
-                                      <p:cBhvr>
-                                        <p:cTn id="50" dur="1" fill="hold">
-                                          <p:stCondLst>
-                                            <p:cond delay="0"/>
-                                          </p:stCondLst>
-                                        </p:cTn>
-                                        <p:tgtEl>
-                                          <p:spTgt spid="13"/>
-                                        </p:tgtEl>
-                                        <p:attrNameLst>
-                                          <p:attrName>style.visibility</p:attrName>
-                                        </p:attrNameLst>
-                                      </p:cBhvr>
-                                      <p:to>
-                                        <p:strVal val="visible"/>
-                                      </p:to>
-                                    </p:set>
-                                  </p:childTnLst>
-                                </p:cTn>
-                              </p:par>
-                            </p:childTnLst>
-                          </p:cTn>
-                        </p:par>
-                      </p:childTnLst>
-                    </p:cTn>
-                  </p:par>
-                  <p:par>
-                    <p:cTn id="51" fill="hold">
-                      <p:stCondLst>
-                        <p:cond delay="indefinite"/>
-                      </p:stCondLst>
-                      <p:childTnLst>
-                        <p:par>
-                          <p:cTn id="52" fill="hold">
-                            <p:stCondLst>
-                              <p:cond delay="0"/>
-                            </p:stCondLst>
-                            <p:childTnLst>
-                              <p:par>
-                                <p:cTn id="53" presetID="1" presetClass="entr" presetSubtype="0" fill="hold" nodeType="clickEffect">
-                                  <p:stCondLst>
-                                    <p:cond delay="0"/>
-                                  </p:stCondLst>
-                                  <p:childTnLst>
-                                    <p:set>
-                                      <p:cBhvr>
-                                        <p:cTn id="54" dur="1" fill="hold">
-                                          <p:stCondLst>
-                                            <p:cond delay="0"/>
-                                          </p:stCondLst>
-                                        </p:cTn>
-                                        <p:tgtEl>
-                                          <p:spTgt spid="96"/>
-                                        </p:tgtEl>
-                                        <p:attrNameLst>
-                                          <p:attrName>style.visibility</p:attrName>
-                                        </p:attrNameLst>
-                                      </p:cBhvr>
-                                      <p:to>
-                                        <p:strVal val="visible"/>
-                                      </p:to>
-                                    </p:set>
-                                  </p:childTnLst>
-                                </p:cTn>
-                              </p:par>
-                            </p:childTnLst>
-                          </p:cTn>
-                        </p:par>
-                      </p:childTnLst>
-                    </p:cTn>
-                  </p:par>
-                  <p:par>
-                    <p:cTn id="55" fill="hold">
-                      <p:stCondLst>
-                        <p:cond delay="indefinite"/>
-                      </p:stCondLst>
-                      <p:childTnLst>
-                        <p:par>
-                          <p:cTn id="56" fill="hold">
-                            <p:stCondLst>
-                              <p:cond delay="0"/>
-                            </p:stCondLst>
-                            <p:childTnLst>
-                              <p:par>
-                                <p:cTn id="57" presetID="1" presetClass="entr" presetSubtype="0" fill="hold" grpId="0" nodeType="clickEffect">
+                                <p:cTn id="57" presetID="1" presetClass="entr" presetSubtype="0" fill="hold" nodeType="withEffect">
                                   <p:stCondLst>
                                     <p:cond delay="0"/>
                                   </p:stCondLst>
@@ -22227,7 +22860,7 @@
                                           </p:stCondLst>
                                         </p:cTn>
                                         <p:tgtEl>
-                                          <p:spTgt spid="114"/>
+                                          <p:spTgt spid="13"/>
                                         </p:tgtEl>
                                         <p:attrNameLst>
                                           <p:attrName>style.visibility</p:attrName>
@@ -22254,7 +22887,7 @@
                                           </p:stCondLst>
                                         </p:cTn>
                                         <p:tgtEl>
-                                          <p:spTgt spid="160"/>
+                                          <p:spTgt spid="23"/>
                                         </p:tgtEl>
                                         <p:attrNameLst>
                                           <p:attrName>style.visibility</p:attrName>
@@ -22267,35 +22900,26 @@
                                   </p:childTnLst>
                                 </p:cTn>
                               </p:par>
+                            </p:childTnLst>
+                          </p:cTn>
+                        </p:par>
+                      </p:childTnLst>
+                    </p:cTn>
+                  </p:par>
+                  <p:par>
+                    <p:cTn id="61" fill="hold">
+                      <p:stCondLst>
+                        <p:cond delay="indefinite"/>
+                      </p:stCondLst>
+                      <p:childTnLst>
+                        <p:par>
+                          <p:cTn id="62" fill="hold">
+                            <p:stCondLst>
+                              <p:cond delay="0"/>
+                            </p:stCondLst>
+                            <p:childTnLst>
                               <p:par>
-                                <p:cTn id="61" presetID="1" presetClass="entr" presetSubtype="0" fill="hold" nodeType="withEffect">
-                                  <p:stCondLst>
-                                    <p:cond delay="0"/>
-                                  </p:stCondLst>
-                                  <p:childTnLst>
-                                    <p:set>
-                                      <p:cBhvr>
-                                        <p:cTn id="62" dur="1" fill="hold">
-                                          <p:stCondLst>
-                                            <p:cond delay="0"/>
-                                          </p:stCondLst>
-                                        </p:cTn>
-                                        <p:tgtEl>
-                                          <p:spTgt spid="159"/>
-                                        </p:tgtEl>
-                                        <p:attrNameLst>
-                                          <p:attrName>style.visibility</p:attrName>
-                                        </p:attrNameLst>
-                                      </p:cBhvr>
-                                      <p:to>
-                                        <p:strVal val="visible"/>
-                                      </p:to>
-                                    </p:set>
-                                  </p:childTnLst>
-                                </p:cTn>
-                              </p:par>
-                              <p:par>
-                                <p:cTn id="63" presetID="1" presetClass="entr" presetSubtype="0" fill="hold" nodeType="withEffect">
+                                <p:cTn id="63" presetID="1" presetClass="entr" presetSubtype="0" fill="hold" nodeType="clickEffect">
                                   <p:stCondLst>
                                     <p:cond delay="0"/>
                                   </p:stCondLst>
@@ -22308,7 +22932,7 @@
                                           </p:stCondLst>
                                         </p:cTn>
                                         <p:tgtEl>
-                                          <p:spTgt spid="151"/>
+                                          <p:spTgt spid="96"/>
                                         </p:tgtEl>
                                         <p:attrNameLst>
                                           <p:attrName>style.visibility</p:attrName>
@@ -22335,61 +22959,7 @@
                                           </p:stCondLst>
                                         </p:cTn>
                                         <p:tgtEl>
-                                          <p:spTgt spid="119"/>
-                                        </p:tgtEl>
-                                        <p:attrNameLst>
-                                          <p:attrName>style.visibility</p:attrName>
-                                        </p:attrNameLst>
-                                      </p:cBhvr>
-                                      <p:to>
-                                        <p:strVal val="visible"/>
-                                      </p:to>
-                                    </p:set>
-                                  </p:childTnLst>
-                                </p:cTn>
-                              </p:par>
-                              <p:par>
-                                <p:cTn id="67" presetID="1" presetClass="entr" presetSubtype="0" fill="hold" grpId="0" nodeType="withEffect">
-                                  <p:stCondLst>
-                                    <p:cond delay="0"/>
-                                  </p:stCondLst>
-                                  <p:childTnLst>
-                                    <p:set>
-                                      <p:cBhvr>
-                                        <p:cTn id="68" dur="1" fill="hold">
-                                          <p:stCondLst>
-                                            <p:cond delay="0"/>
-                                          </p:stCondLst>
-                                        </p:cTn>
-                                        <p:tgtEl>
-                                          <p:spTgt spid="182"/>
-                                        </p:tgtEl>
-                                        <p:attrNameLst>
-                                          <p:attrName>style.visibility</p:attrName>
-                                        </p:attrNameLst>
-                                      </p:cBhvr>
-                                      <p:to>
-                                        <p:strVal val="visible"/>
-                                      </p:to>
-                                    </p:set>
-                                  </p:childTnLst>
-                                </p:cTn>
-                              </p:par>
-                              <p:par>
-                                <p:cTn id="69" presetID="1" presetClass="entr" presetSubtype="0" fill="hold" nodeType="withEffect">
-                                  <p:stCondLst>
-                                    <p:cond delay="0"/>
-                                  </p:stCondLst>
-                                  <p:childTnLst>
-                                    <p:set>
-                                      <p:cBhvr>
-                                        <p:cTn id="70" dur="1" fill="hold">
-                                          <p:stCondLst>
-                                            <p:cond delay="0"/>
-                                          </p:stCondLst>
-                                        </p:cTn>
-                                        <p:tgtEl>
-                                          <p:spTgt spid="176"/>
+                                          <p:spTgt spid="34"/>
                                         </p:tgtEl>
                                         <p:attrNameLst>
                                           <p:attrName>style.visibility</p:attrName>
@@ -22409,32 +22979,32 @@
                     </p:cTn>
                   </p:par>
                   <p:par>
-                    <p:cTn id="71" fill="hold">
+                    <p:cTn id="67" fill="hold">
                       <p:stCondLst>
                         <p:cond delay="indefinite"/>
                       </p:stCondLst>
                       <p:childTnLst>
                         <p:par>
-                          <p:cTn id="72" fill="hold">
+                          <p:cTn id="68" fill="hold">
                             <p:stCondLst>
                               <p:cond delay="0"/>
                             </p:stCondLst>
                             <p:childTnLst>
                               <p:par>
-                                <p:cTn id="73" presetID="1" presetClass="entr" presetSubtype="0" fill="hold" nodeType="clickEffect">
+                                <p:cTn id="69" presetID="1" presetClass="entr" presetSubtype="0" fill="hold" grpId="0" nodeType="clickEffect">
                                   <p:stCondLst>
                                     <p:cond delay="0"/>
                                   </p:stCondLst>
                                   <p:childTnLst>
                                     <p:set>
                                       <p:cBhvr>
-                                        <p:cTn id="74" dur="1" fill="hold">
+                                        <p:cTn id="70" dur="1" fill="hold">
                                           <p:stCondLst>
                                             <p:cond delay="0"/>
                                           </p:stCondLst>
                                         </p:cTn>
                                         <p:tgtEl>
-                                          <p:spTgt spid="134"/>
+                                          <p:spTgt spid="114"/>
                                         </p:tgtEl>
                                         <p:attrNameLst>
                                           <p:attrName>style.visibility</p:attrName>
@@ -22448,20 +23018,20 @@
                                 </p:cTn>
                               </p:par>
                               <p:par>
-                                <p:cTn id="75" presetID="1" presetClass="entr" presetSubtype="0" fill="hold" grpId="0" nodeType="withEffect">
+                                <p:cTn id="71" presetID="1" presetClass="entr" presetSubtype="0" fill="hold" grpId="0" nodeType="withEffect">
                                   <p:stCondLst>
                                     <p:cond delay="0"/>
                                   </p:stCondLst>
                                   <p:childTnLst>
                                     <p:set>
                                       <p:cBhvr>
-                                        <p:cTn id="76" dur="1" fill="hold">
+                                        <p:cTn id="72" dur="1" fill="hold">
                                           <p:stCondLst>
                                             <p:cond delay="0"/>
                                           </p:stCondLst>
                                         </p:cTn>
                                         <p:tgtEl>
-                                          <p:spTgt spid="132"/>
+                                          <p:spTgt spid="160"/>
                                         </p:tgtEl>
                                         <p:attrNameLst>
                                           <p:attrName>style.visibility</p:attrName>
@@ -22475,7 +23045,61 @@
                                 </p:cTn>
                               </p:par>
                               <p:par>
-                                <p:cTn id="77" presetID="1" presetClass="entr" presetSubtype="0" fill="hold" nodeType="withEffect">
+                                <p:cTn id="73" presetID="1" presetClass="entr" presetSubtype="0" fill="hold" nodeType="withEffect">
+                                  <p:stCondLst>
+                                    <p:cond delay="0"/>
+                                  </p:stCondLst>
+                                  <p:childTnLst>
+                                    <p:set>
+                                      <p:cBhvr>
+                                        <p:cTn id="74" dur="1" fill="hold">
+                                          <p:stCondLst>
+                                            <p:cond delay="0"/>
+                                          </p:stCondLst>
+                                        </p:cTn>
+                                        <p:tgtEl>
+                                          <p:spTgt spid="159"/>
+                                        </p:tgtEl>
+                                        <p:attrNameLst>
+                                          <p:attrName>style.visibility</p:attrName>
+                                        </p:attrNameLst>
+                                      </p:cBhvr>
+                                      <p:to>
+                                        <p:strVal val="visible"/>
+                                      </p:to>
+                                    </p:set>
+                                  </p:childTnLst>
+                                </p:cTn>
+                              </p:par>
+                              <p:par>
+                                <p:cTn id="75" presetID="1" presetClass="entr" presetSubtype="0" fill="hold" nodeType="withEffect">
+                                  <p:stCondLst>
+                                    <p:cond delay="0"/>
+                                  </p:stCondLst>
+                                  <p:childTnLst>
+                                    <p:set>
+                                      <p:cBhvr>
+                                        <p:cTn id="76" dur="1" fill="hold">
+                                          <p:stCondLst>
+                                            <p:cond delay="0"/>
+                                          </p:stCondLst>
+                                        </p:cTn>
+                                        <p:tgtEl>
+                                          <p:spTgt spid="151"/>
+                                        </p:tgtEl>
+                                        <p:attrNameLst>
+                                          <p:attrName>style.visibility</p:attrName>
+                                        </p:attrNameLst>
+                                      </p:cBhvr>
+                                      <p:to>
+                                        <p:strVal val="visible"/>
+                                      </p:to>
+                                    </p:set>
+                                  </p:childTnLst>
+                                </p:cTn>
+                              </p:par>
+                              <p:par>
+                                <p:cTn id="77" presetID="1" presetClass="entr" presetSubtype="0" fill="hold" grpId="0" nodeType="withEffect">
                                   <p:stCondLst>
                                     <p:cond delay="0"/>
                                   </p:stCondLst>
@@ -22488,7 +23112,7 @@
                                           </p:stCondLst>
                                         </p:cTn>
                                         <p:tgtEl>
-                                          <p:spTgt spid="158"/>
+                                          <p:spTgt spid="119"/>
                                         </p:tgtEl>
                                         <p:attrNameLst>
                                           <p:attrName>style.visibility</p:attrName>
@@ -22515,7 +23139,34 @@
                                           </p:stCondLst>
                                         </p:cTn>
                                         <p:tgtEl>
-                                          <p:spTgt spid="118"/>
+                                          <p:spTgt spid="182"/>
+                                        </p:tgtEl>
+                                        <p:attrNameLst>
+                                          <p:attrName>style.visibility</p:attrName>
+                                        </p:attrNameLst>
+                                      </p:cBhvr>
+                                      <p:to>
+                                        <p:strVal val="visible"/>
+                                      </p:to>
+                                    </p:set>
+                                  </p:childTnLst>
+                                </p:cTn>
+                              </p:par>
+                              <p:par>
+                                <p:cTn id="81" presetID="1" presetClass="entr" presetSubtype="0" fill="hold" nodeType="withEffect">
+                                  <p:stCondLst>
+                                    <p:cond delay="0"/>
+                                  </p:stCondLst>
+                                  <p:childTnLst>
+                                    <p:set>
+                                      <p:cBhvr>
+                                        <p:cTn id="82" dur="1" fill="hold">
+                                          <p:stCondLst>
+                                            <p:cond delay="0"/>
+                                          </p:stCondLst>
+                                        </p:cTn>
+                                        <p:tgtEl>
+                                          <p:spTgt spid="176"/>
                                         </p:tgtEl>
                                         <p:attrNameLst>
                                           <p:attrName>style.visibility</p:attrName>
@@ -22535,46 +23186,19 @@
                     </p:cTn>
                   </p:par>
                   <p:par>
-                    <p:cTn id="81" fill="hold">
+                    <p:cTn id="83" fill="hold">
                       <p:stCondLst>
                         <p:cond delay="indefinite"/>
                       </p:stCondLst>
                       <p:childTnLst>
                         <p:par>
-                          <p:cTn id="82" fill="hold">
+                          <p:cTn id="84" fill="hold">
                             <p:stCondLst>
                               <p:cond delay="0"/>
                             </p:stCondLst>
                             <p:childTnLst>
                               <p:par>
-                                <p:cTn id="83" presetID="1" presetClass="entr" presetSubtype="0" fill="hold" nodeType="clickEffect">
-                                  <p:stCondLst>
-                                    <p:cond delay="0"/>
-                                  </p:stCondLst>
-                                  <p:childTnLst>
-                                    <p:set>
-                                      <p:cBhvr>
-                                        <p:cTn id="84" dur="1" fill="hold">
-                                          <p:stCondLst>
-                                            <p:cond delay="0"/>
-                                          </p:stCondLst>
-                                        </p:cTn>
-                                        <p:tgtEl>
-                                          <p:spTgt spid="153"/>
-                                        </p:tgtEl>
-                                        <p:attrNameLst>
-                                          <p:attrName>style.visibility</p:attrName>
-                                        </p:attrNameLst>
-                                      </p:cBhvr>
-                                      <p:to>
-                                        <p:strVal val="visible"/>
-                                      </p:to>
-                                    </p:set>
-                                  </p:childTnLst>
-                                </p:cTn>
-                              </p:par>
-                              <p:par>
-                                <p:cTn id="85" presetID="1" presetClass="entr" presetSubtype="0" fill="hold" grpId="0" nodeType="withEffect">
+                                <p:cTn id="85" presetID="1" presetClass="entr" presetSubtype="0" fill="hold" nodeType="clickEffect">
                                   <p:stCondLst>
                                     <p:cond delay="0"/>
                                   </p:stCondLst>
@@ -22587,7 +23211,7 @@
                                           </p:stCondLst>
                                         </p:cTn>
                                         <p:tgtEl>
-                                          <p:spTgt spid="167"/>
+                                          <p:spTgt spid="134"/>
                                         </p:tgtEl>
                                         <p:attrNameLst>
                                           <p:attrName>style.visibility</p:attrName>
@@ -22614,7 +23238,7 @@
                                           </p:stCondLst>
                                         </p:cTn>
                                         <p:tgtEl>
-                                          <p:spTgt spid="164"/>
+                                          <p:spTgt spid="35"/>
                                         </p:tgtEl>
                                         <p:attrNameLst>
                                           <p:attrName>style.visibility</p:attrName>
@@ -22641,7 +23265,7 @@
                                           </p:stCondLst>
                                         </p:cTn>
                                         <p:tgtEl>
-                                          <p:spTgt spid="163"/>
+                                          <p:spTgt spid="132"/>
                                         </p:tgtEl>
                                         <p:attrNameLst>
                                           <p:attrName>style.visibility</p:attrName>
@@ -22668,7 +23292,34 @@
                                           </p:stCondLst>
                                         </p:cTn>
                                         <p:tgtEl>
-                                          <p:spTgt spid="149"/>
+                                          <p:spTgt spid="158"/>
+                                        </p:tgtEl>
+                                        <p:attrNameLst>
+                                          <p:attrName>style.visibility</p:attrName>
+                                        </p:attrNameLst>
+                                      </p:cBhvr>
+                                      <p:to>
+                                        <p:strVal val="visible"/>
+                                      </p:to>
+                                    </p:set>
+                                  </p:childTnLst>
+                                </p:cTn>
+                              </p:par>
+                              <p:par>
+                                <p:cTn id="93" presetID="1" presetClass="entr" presetSubtype="0" fill="hold" grpId="0" nodeType="withEffect">
+                                  <p:stCondLst>
+                                    <p:cond delay="0"/>
+                                  </p:stCondLst>
+                                  <p:childTnLst>
+                                    <p:set>
+                                      <p:cBhvr>
+                                        <p:cTn id="94" dur="1" fill="hold">
+                                          <p:stCondLst>
+                                            <p:cond delay="0"/>
+                                          </p:stCondLst>
+                                        </p:cTn>
+                                        <p:tgtEl>
+                                          <p:spTgt spid="118"/>
                                         </p:tgtEl>
                                         <p:attrNameLst>
                                           <p:attrName>style.visibility</p:attrName>
@@ -22688,32 +23339,32 @@
                     </p:cTn>
                   </p:par>
                   <p:par>
-                    <p:cTn id="93" fill="hold">
+                    <p:cTn id="95" fill="hold">
                       <p:stCondLst>
                         <p:cond delay="indefinite"/>
                       </p:stCondLst>
                       <p:childTnLst>
                         <p:par>
-                          <p:cTn id="94" fill="hold">
+                          <p:cTn id="96" fill="hold">
                             <p:stCondLst>
                               <p:cond delay="0"/>
                             </p:stCondLst>
                             <p:childTnLst>
                               <p:par>
-                                <p:cTn id="95" presetID="1" presetClass="entr" presetSubtype="0" fill="hold" grpId="0" nodeType="clickEffect">
+                                <p:cTn id="97" presetID="1" presetClass="entr" presetSubtype="0" fill="hold" nodeType="clickEffect">
                                   <p:stCondLst>
                                     <p:cond delay="0"/>
                                   </p:stCondLst>
                                   <p:childTnLst>
                                     <p:set>
                                       <p:cBhvr>
-                                        <p:cTn id="96" dur="1" fill="hold">
+                                        <p:cTn id="98" dur="1" fill="hold">
                                           <p:stCondLst>
                                             <p:cond delay="0"/>
                                           </p:stCondLst>
                                         </p:cTn>
                                         <p:tgtEl>
-                                          <p:spTgt spid="85"/>
+                                          <p:spTgt spid="153"/>
                                         </p:tgtEl>
                                         <p:attrNameLst>
                                           <p:attrName>style.visibility</p:attrName>
@@ -22726,26 +23377,8 @@
                                   </p:childTnLst>
                                 </p:cTn>
                               </p:par>
-                            </p:childTnLst>
-                          </p:cTn>
-                        </p:par>
-                      </p:childTnLst>
-                    </p:cTn>
-                  </p:par>
-                  <p:par>
-                    <p:cTn id="97" fill="hold">
-                      <p:stCondLst>
-                        <p:cond delay="indefinite"/>
-                      </p:stCondLst>
-                      <p:childTnLst>
-                        <p:par>
-                          <p:cTn id="98" fill="hold">
-                            <p:stCondLst>
-                              <p:cond delay="0"/>
-                            </p:stCondLst>
-                            <p:childTnLst>
                               <p:par>
-                                <p:cTn id="99" presetID="1" presetClass="entr" presetSubtype="0" fill="hold" grpId="0" nodeType="clickEffect">
+                                <p:cTn id="99" presetID="1" presetClass="entr" presetSubtype="0" fill="hold" grpId="0" nodeType="withEffect">
                                   <p:stCondLst>
                                     <p:cond delay="0"/>
                                   </p:stCondLst>
@@ -22758,7 +23391,7 @@
                                           </p:stCondLst>
                                         </p:cTn>
                                         <p:tgtEl>
-                                          <p:spTgt spid="69"/>
+                                          <p:spTgt spid="167"/>
                                         </p:tgtEl>
                                         <p:attrNameLst>
                                           <p:attrName>style.visibility</p:attrName>
@@ -22785,7 +23418,7 @@
                                           </p:stCondLst>
                                         </p:cTn>
                                         <p:tgtEl>
-                                          <p:spTgt spid="171"/>
+                                          <p:spTgt spid="164"/>
                                         </p:tgtEl>
                                         <p:attrNameLst>
                                           <p:attrName>style.visibility</p:attrName>
@@ -22798,26 +23431,35 @@
                                   </p:childTnLst>
                                 </p:cTn>
                               </p:par>
-                            </p:childTnLst>
-                          </p:cTn>
-                        </p:par>
-                      </p:childTnLst>
-                    </p:cTn>
-                  </p:par>
-                  <p:par>
-                    <p:cTn id="103" fill="hold">
-                      <p:stCondLst>
-                        <p:cond delay="indefinite"/>
-                      </p:stCondLst>
-                      <p:childTnLst>
-                        <p:par>
-                          <p:cTn id="104" fill="hold">
-                            <p:stCondLst>
-                              <p:cond delay="0"/>
-                            </p:stCondLst>
-                            <p:childTnLst>
                               <p:par>
-                                <p:cTn id="105" presetID="1" presetClass="entr" presetSubtype="0" fill="hold" nodeType="clickEffect">
+                                <p:cTn id="103" presetID="1" presetClass="entr" presetSubtype="0" fill="hold" grpId="0" nodeType="withEffect">
+                                  <p:stCondLst>
+                                    <p:cond delay="0"/>
+                                  </p:stCondLst>
+                                  <p:childTnLst>
+                                    <p:set>
+                                      <p:cBhvr>
+                                        <p:cTn id="104" dur="1" fill="hold">
+                                          <p:stCondLst>
+                                            <p:cond delay="0"/>
+                                          </p:stCondLst>
+                                        </p:cTn>
+                                        <p:tgtEl>
+                                          <p:spTgt spid="163"/>
+                                        </p:tgtEl>
+                                        <p:attrNameLst>
+                                          <p:attrName>style.visibility</p:attrName>
+                                        </p:attrNameLst>
+                                      </p:cBhvr>
+                                      <p:to>
+                                        <p:strVal val="visible"/>
+                                      </p:to>
+                                    </p:set>
+                                  </p:childTnLst>
+                                </p:cTn>
+                              </p:par>
+                              <p:par>
+                                <p:cTn id="105" presetID="1" presetClass="entr" presetSubtype="0" fill="hold" nodeType="withEffect">
                                   <p:stCondLst>
                                     <p:cond delay="0"/>
                                   </p:stCondLst>
@@ -22830,7 +23472,7 @@
                                           </p:stCondLst>
                                         </p:cTn>
                                         <p:tgtEl>
-                                          <p:spTgt spid="91"/>
+                                          <p:spTgt spid="149"/>
                                         </p:tgtEl>
                                         <p:attrNameLst>
                                           <p:attrName>style.visibility</p:attrName>
@@ -22857,7 +23499,7 @@
                                           </p:stCondLst>
                                         </p:cTn>
                                         <p:tgtEl>
-                                          <p:spTgt spid="117"/>
+                                          <p:spTgt spid="36"/>
                                         </p:tgtEl>
                                         <p:attrNameLst>
                                           <p:attrName>style.visibility</p:attrName>
@@ -22870,35 +23512,26 @@
                                   </p:childTnLst>
                                 </p:cTn>
                               </p:par>
+                            </p:childTnLst>
+                          </p:cTn>
+                        </p:par>
+                      </p:childTnLst>
+                    </p:cTn>
+                  </p:par>
+                  <p:par>
+                    <p:cTn id="109" fill="hold">
+                      <p:stCondLst>
+                        <p:cond delay="indefinite"/>
+                      </p:stCondLst>
+                      <p:childTnLst>
+                        <p:par>
+                          <p:cTn id="110" fill="hold">
+                            <p:stCondLst>
+                              <p:cond delay="0"/>
+                            </p:stCondLst>
+                            <p:childTnLst>
                               <p:par>
-                                <p:cTn id="109" presetID="1" presetClass="entr" presetSubtype="0" fill="hold" grpId="0" nodeType="withEffect">
-                                  <p:stCondLst>
-                                    <p:cond delay="0"/>
-                                  </p:stCondLst>
-                                  <p:childTnLst>
-                                    <p:set>
-                                      <p:cBhvr>
-                                        <p:cTn id="110" dur="1" fill="hold">
-                                          <p:stCondLst>
-                                            <p:cond delay="0"/>
-                                          </p:stCondLst>
-                                        </p:cTn>
-                                        <p:tgtEl>
-                                          <p:spTgt spid="185"/>
-                                        </p:tgtEl>
-                                        <p:attrNameLst>
-                                          <p:attrName>style.visibility</p:attrName>
-                                        </p:attrNameLst>
-                                      </p:cBhvr>
-                                      <p:to>
-                                        <p:strVal val="visible"/>
-                                      </p:to>
-                                    </p:set>
-                                  </p:childTnLst>
-                                </p:cTn>
-                              </p:par>
-                              <p:par>
-                                <p:cTn id="111" presetID="1" presetClass="entr" presetSubtype="0" fill="hold" grpId="0" nodeType="withEffect">
+                                <p:cTn id="111" presetID="1" presetClass="entr" presetSubtype="0" fill="hold" grpId="0" nodeType="clickEffect">
                                   <p:stCondLst>
                                     <p:cond delay="0"/>
                                   </p:stCondLst>
@@ -22911,7 +23544,7 @@
                                           </p:stCondLst>
                                         </p:cTn>
                                         <p:tgtEl>
-                                          <p:spTgt spid="131"/>
+                                          <p:spTgt spid="85"/>
                                         </p:tgtEl>
                                         <p:attrNameLst>
                                           <p:attrName>style.visibility</p:attrName>
@@ -22938,34 +23571,7 @@
                                           </p:stCondLst>
                                         </p:cTn>
                                         <p:tgtEl>
-                                          <p:spTgt spid="133"/>
-                                        </p:tgtEl>
-                                        <p:attrNameLst>
-                                          <p:attrName>style.visibility</p:attrName>
-                                        </p:attrNameLst>
-                                      </p:cBhvr>
-                                      <p:to>
-                                        <p:strVal val="visible"/>
-                                      </p:to>
-                                    </p:set>
-                                  </p:childTnLst>
-                                </p:cTn>
-                              </p:par>
-                              <p:par>
-                                <p:cTn id="115" presetID="1" presetClass="entr" presetSubtype="0" fill="hold" nodeType="withEffect">
-                                  <p:stCondLst>
-                                    <p:cond delay="0"/>
-                                  </p:stCondLst>
-                                  <p:childTnLst>
-                                    <p:set>
-                                      <p:cBhvr>
-                                        <p:cTn id="116" dur="1" fill="hold">
-                                          <p:stCondLst>
-                                            <p:cond delay="0"/>
-                                          </p:stCondLst>
-                                        </p:cTn>
-                                        <p:tgtEl>
-                                          <p:spTgt spid="165"/>
+                                          <p:spTgt spid="26"/>
                                         </p:tgtEl>
                                         <p:attrNameLst>
                                           <p:attrName>style.visibility</p:attrName>
@@ -22985,19 +23591,46 @@
                     </p:cTn>
                   </p:par>
                   <p:par>
-                    <p:cTn id="117" fill="hold">
+                    <p:cTn id="115" fill="hold">
                       <p:stCondLst>
                         <p:cond delay="indefinite"/>
                       </p:stCondLst>
                       <p:childTnLst>
                         <p:par>
-                          <p:cTn id="118" fill="hold">
+                          <p:cTn id="116" fill="hold">
                             <p:stCondLst>
                               <p:cond delay="0"/>
                             </p:stCondLst>
                             <p:childTnLst>
                               <p:par>
-                                <p:cTn id="119" presetID="1" presetClass="entr" presetSubtype="0" fill="hold" grpId="0" nodeType="clickEffect">
+                                <p:cTn id="117" presetID="1" presetClass="entr" presetSubtype="0" fill="hold" grpId="0" nodeType="clickEffect">
+                                  <p:stCondLst>
+                                    <p:cond delay="0"/>
+                                  </p:stCondLst>
+                                  <p:childTnLst>
+                                    <p:set>
+                                      <p:cBhvr>
+                                        <p:cTn id="118" dur="1" fill="hold">
+                                          <p:stCondLst>
+                                            <p:cond delay="0"/>
+                                          </p:stCondLst>
+                                        </p:cTn>
+                                        <p:tgtEl>
+                                          <p:spTgt spid="69"/>
+                                        </p:tgtEl>
+                                        <p:attrNameLst>
+                                          <p:attrName>style.visibility</p:attrName>
+                                        </p:attrNameLst>
+                                      </p:cBhvr>
+                                      <p:to>
+                                        <p:strVal val="visible"/>
+                                      </p:to>
+                                    </p:set>
+                                  </p:childTnLst>
+                                </p:cTn>
+                              </p:par>
+                              <p:par>
+                                <p:cTn id="119" presetID="1" presetClass="entr" presetSubtype="0" fill="hold" grpId="0" nodeType="withEffect">
                                   <p:stCondLst>
                                     <p:cond delay="0"/>
                                   </p:stCondLst>
@@ -23005,6 +23638,78 @@
                                     <p:set>
                                       <p:cBhvr>
                                         <p:cTn id="120" dur="1" fill="hold">
+                                          <p:stCondLst>
+                                            <p:cond delay="0"/>
+                                          </p:stCondLst>
+                                        </p:cTn>
+                                        <p:tgtEl>
+                                          <p:spTgt spid="171"/>
+                                        </p:tgtEl>
+                                        <p:attrNameLst>
+                                          <p:attrName>style.visibility</p:attrName>
+                                        </p:attrNameLst>
+                                      </p:cBhvr>
+                                      <p:to>
+                                        <p:strVal val="visible"/>
+                                      </p:to>
+                                    </p:set>
+                                  </p:childTnLst>
+                                </p:cTn>
+                              </p:par>
+                              <p:par>
+                                <p:cTn id="121" presetID="1" presetClass="entr" presetSubtype="0" fill="hold" grpId="0" nodeType="withEffect">
+                                  <p:stCondLst>
+                                    <p:cond delay="0"/>
+                                  </p:stCondLst>
+                                  <p:childTnLst>
+                                    <p:set>
+                                      <p:cBhvr>
+                                        <p:cTn id="122" dur="1" fill="hold">
+                                          <p:stCondLst>
+                                            <p:cond delay="0"/>
+                                          </p:stCondLst>
+                                        </p:cTn>
+                                        <p:tgtEl>
+                                          <p:spTgt spid="28"/>
+                                        </p:tgtEl>
+                                        <p:attrNameLst>
+                                          <p:attrName>style.visibility</p:attrName>
+                                        </p:attrNameLst>
+                                      </p:cBhvr>
+                                      <p:to>
+                                        <p:strVal val="visible"/>
+                                      </p:to>
+                                    </p:set>
+                                  </p:childTnLst>
+                                </p:cTn>
+                              </p:par>
+                            </p:childTnLst>
+                          </p:cTn>
+                        </p:par>
+                      </p:childTnLst>
+                    </p:cTn>
+                  </p:par>
+                  <p:par>
+                    <p:cTn id="123" fill="hold">
+                      <p:stCondLst>
+                        <p:cond delay="indefinite"/>
+                      </p:stCondLst>
+                      <p:childTnLst>
+                        <p:par>
+                          <p:cTn id="124" fill="hold">
+                            <p:stCondLst>
+                              <p:cond delay="0"/>
+                            </p:stCondLst>
+                            <p:childTnLst>
+                              <p:par>
+                                <p:cTn id="125" presetID="1" presetClass="entr" presetSubtype="0" fill="hold" grpId="0" nodeType="clickEffect">
+                                  <p:stCondLst>
+                                    <p:cond delay="0"/>
+                                  </p:stCondLst>
+                                  <p:childTnLst>
+                                    <p:set>
+                                      <p:cBhvr>
+                                        <p:cTn id="126" dur="1" fill="hold">
                                           <p:stCondLst>
                                             <p:cond delay="0"/>
                                           </p:stCondLst>
@@ -23024,20 +23729,200 @@
                                 </p:cTn>
                               </p:par>
                               <p:par>
-                                <p:cTn id="121" presetID="1" presetClass="entr" presetSubtype="0" fill="hold" nodeType="withEffect">
+                                <p:cTn id="127" presetID="1" presetClass="entr" presetSubtype="0" fill="hold" nodeType="withEffect">
                                   <p:stCondLst>
                                     <p:cond delay="0"/>
                                   </p:stCondLst>
                                   <p:childTnLst>
                                     <p:set>
                                       <p:cBhvr>
-                                        <p:cTn id="122" dur="1" fill="hold">
+                                        <p:cTn id="128" dur="1" fill="hold">
                                           <p:stCondLst>
                                             <p:cond delay="0"/>
                                           </p:stCondLst>
                                         </p:cTn>
                                         <p:tgtEl>
                                           <p:spTgt spid="172"/>
+                                        </p:tgtEl>
+                                        <p:attrNameLst>
+                                          <p:attrName>style.visibility</p:attrName>
+                                        </p:attrNameLst>
+                                      </p:cBhvr>
+                                      <p:to>
+                                        <p:strVal val="visible"/>
+                                      </p:to>
+                                    </p:set>
+                                  </p:childTnLst>
+                                </p:cTn>
+                              </p:par>
+                            </p:childTnLst>
+                          </p:cTn>
+                        </p:par>
+                      </p:childTnLst>
+                    </p:cTn>
+                  </p:par>
+                  <p:par>
+                    <p:cTn id="129" fill="hold">
+                      <p:stCondLst>
+                        <p:cond delay="indefinite"/>
+                      </p:stCondLst>
+                      <p:childTnLst>
+                        <p:par>
+                          <p:cTn id="130" fill="hold">
+                            <p:stCondLst>
+                              <p:cond delay="0"/>
+                            </p:stCondLst>
+                            <p:childTnLst>
+                              <p:par>
+                                <p:cTn id="131" presetID="1" presetClass="entr" presetSubtype="0" fill="hold" nodeType="clickEffect">
+                                  <p:stCondLst>
+                                    <p:cond delay="0"/>
+                                  </p:stCondLst>
+                                  <p:childTnLst>
+                                    <p:set>
+                                      <p:cBhvr>
+                                        <p:cTn id="132" dur="1" fill="hold">
+                                          <p:stCondLst>
+                                            <p:cond delay="0"/>
+                                          </p:stCondLst>
+                                        </p:cTn>
+                                        <p:tgtEl>
+                                          <p:spTgt spid="91"/>
+                                        </p:tgtEl>
+                                        <p:attrNameLst>
+                                          <p:attrName>style.visibility</p:attrName>
+                                        </p:attrNameLst>
+                                      </p:cBhvr>
+                                      <p:to>
+                                        <p:strVal val="visible"/>
+                                      </p:to>
+                                    </p:set>
+                                  </p:childTnLst>
+                                </p:cTn>
+                              </p:par>
+                              <p:par>
+                                <p:cTn id="133" presetID="1" presetClass="entr" presetSubtype="0" fill="hold" grpId="0" nodeType="withEffect">
+                                  <p:stCondLst>
+                                    <p:cond delay="0"/>
+                                  </p:stCondLst>
+                                  <p:childTnLst>
+                                    <p:set>
+                                      <p:cBhvr>
+                                        <p:cTn id="134" dur="1" fill="hold">
+                                          <p:stCondLst>
+                                            <p:cond delay="0"/>
+                                          </p:stCondLst>
+                                        </p:cTn>
+                                        <p:tgtEl>
+                                          <p:spTgt spid="117"/>
+                                        </p:tgtEl>
+                                        <p:attrNameLst>
+                                          <p:attrName>style.visibility</p:attrName>
+                                        </p:attrNameLst>
+                                      </p:cBhvr>
+                                      <p:to>
+                                        <p:strVal val="visible"/>
+                                      </p:to>
+                                    </p:set>
+                                  </p:childTnLst>
+                                </p:cTn>
+                              </p:par>
+                              <p:par>
+                                <p:cTn id="135" presetID="1" presetClass="entr" presetSubtype="0" fill="hold" grpId="0" nodeType="withEffect">
+                                  <p:stCondLst>
+                                    <p:cond delay="0"/>
+                                  </p:stCondLst>
+                                  <p:childTnLst>
+                                    <p:set>
+                                      <p:cBhvr>
+                                        <p:cTn id="136" dur="1" fill="hold">
+                                          <p:stCondLst>
+                                            <p:cond delay="0"/>
+                                          </p:stCondLst>
+                                        </p:cTn>
+                                        <p:tgtEl>
+                                          <p:spTgt spid="185"/>
+                                        </p:tgtEl>
+                                        <p:attrNameLst>
+                                          <p:attrName>style.visibility</p:attrName>
+                                        </p:attrNameLst>
+                                      </p:cBhvr>
+                                      <p:to>
+                                        <p:strVal val="visible"/>
+                                      </p:to>
+                                    </p:set>
+                                  </p:childTnLst>
+                                </p:cTn>
+                              </p:par>
+                              <p:par>
+                                <p:cTn id="137" presetID="1" presetClass="entr" presetSubtype="0" fill="hold" grpId="0" nodeType="withEffect">
+                                  <p:stCondLst>
+                                    <p:cond delay="0"/>
+                                  </p:stCondLst>
+                                  <p:childTnLst>
+                                    <p:set>
+                                      <p:cBhvr>
+                                        <p:cTn id="138" dur="1" fill="hold">
+                                          <p:stCondLst>
+                                            <p:cond delay="0"/>
+                                          </p:stCondLst>
+                                        </p:cTn>
+                                        <p:tgtEl>
+                                          <p:spTgt spid="131"/>
+                                        </p:tgtEl>
+                                        <p:attrNameLst>
+                                          <p:attrName>style.visibility</p:attrName>
+                                        </p:attrNameLst>
+                                      </p:cBhvr>
+                                      <p:to>
+                                        <p:strVal val="visible"/>
+                                      </p:to>
+                                    </p:set>
+                                  </p:childTnLst>
+                                </p:cTn>
+                              </p:par>
+                              <p:par>
+                                <p:cTn id="139" presetID="1" presetClass="entr" presetSubtype="0" fill="hold" grpId="0" nodeType="withEffect">
+                                  <p:stCondLst>
+                                    <p:cond delay="0"/>
+                                  </p:stCondLst>
+                                  <p:childTnLst>
+                                    <p:set>
+                                      <p:cBhvr>
+                                        <p:cTn id="140" dur="1" fill="hold">
+                                          <p:stCondLst>
+                                            <p:cond delay="0"/>
+                                          </p:stCondLst>
+                                        </p:cTn>
+                                        <p:tgtEl>
+                                          <p:spTgt spid="133"/>
+                                        </p:tgtEl>
+                                        <p:attrNameLst>
+                                          <p:attrName>style.visibility</p:attrName>
+                                        </p:attrNameLst>
+                                      </p:cBhvr>
+                                      <p:to>
+                                        <p:strVal val="visible"/>
+                                      </p:to>
+                                    </p:set>
+                                  </p:childTnLst>
+                                </p:cTn>
+                              </p:par>
+                              <p:par>
+                                <p:cTn id="141" presetID="1" presetClass="entr" presetSubtype="0" fill="hold" nodeType="withEffect">
+                                  <p:stCondLst>
+                                    <p:cond delay="0"/>
+                                  </p:stCondLst>
+                                  <p:childTnLst>
+                                    <p:set>
+                                      <p:cBhvr>
+                                        <p:cTn id="142" dur="1" fill="hold">
+                                          <p:stCondLst>
+                                            <p:cond delay="0"/>
+                                          </p:stCondLst>
+                                        </p:cTn>
+                                        <p:tgtEl>
+                                          <p:spTgt spid="165"/>
                                         </p:tgtEl>
                                         <p:attrNameLst>
                                           <p:attrName>style.visibility</p:attrName>
@@ -23078,6 +23963,7 @@
       </p:par>
     </p:tnLst>
     <p:bldLst>
+      <p:bldP spid="23" grpId="0" animBg="1"/>
       <p:bldP spid="69" grpId="0" animBg="1"/>
       <p:bldP spid="84" grpId="0" animBg="1"/>
       <p:bldP spid="85" grpId="0" animBg="1"/>
@@ -23101,6 +23987,15 @@
       <p:bldP spid="185" grpId="0" animBg="1"/>
       <p:bldP spid="18" grpId="0" animBg="1"/>
       <p:bldP spid="19" grpId="0" animBg="1"/>
+      <p:bldP spid="24" grpId="0" animBg="1"/>
+      <p:bldP spid="26" grpId="0" animBg="1"/>
+      <p:bldP spid="28" grpId="0" animBg="1"/>
+      <p:bldP spid="30" grpId="0" animBg="1"/>
+      <p:bldP spid="31" grpId="0" animBg="1"/>
+      <p:bldP spid="33" grpId="0" animBg="1"/>
+      <p:bldP spid="34" grpId="0" animBg="1"/>
+      <p:bldP spid="35" grpId="0" animBg="1"/>
+      <p:bldP spid="36" grpId="0" animBg="1"/>
     </p:bldLst>
   </p:timing>
 </p:sld>
@@ -23157,7 +24052,7 @@
           <a:p>
             <a:r>
               <a:rPr lang="fr-FR" dirty="0"/>
-              <a:t>Pipeline Training &amp; Monitoring</a:t>
+              <a:t>Versioning des données</a:t>
             </a:r>
             <a:endParaRPr lang="en-US" dirty="0"/>
           </a:p>
@@ -23283,6 +24178,1418 @@
         </p:nvSpPr>
         <p:spPr>
           <a:xfrm>
+            <a:off x="828773" y="1198563"/>
+            <a:ext cx="10963275" cy="5155078"/>
+          </a:xfrm>
+        </p:spPr>
+        <p:txBody>
+          <a:bodyPr/>
+          <a:lstStyle/>
+          <a:p>
+            <a:r>
+              <a:rPr lang="fr-FR" dirty="0"/>
+              <a:t>Docker TRAINING-Admin-Backend</a:t>
+            </a:r>
+          </a:p>
+          <a:p>
+            <a:pPr lvl="1"/>
+            <a:r>
+              <a:rPr lang="fr-FR" dirty="0"/>
+              <a:t>Au lancement du docker : Les données sont initialisées</a:t>
+            </a:r>
+          </a:p>
+          <a:p>
+            <a:pPr lvl="2"/>
+            <a:r>
+              <a:rPr lang="fr-FR" b="1" dirty="0"/>
+              <a:t>git clone</a:t>
+            </a:r>
+          </a:p>
+          <a:p>
+            <a:pPr lvl="2"/>
+            <a:r>
+              <a:rPr lang="fr-FR" b="1" dirty="0" err="1"/>
+              <a:t>dvc</a:t>
+            </a:r>
+            <a:r>
+              <a:rPr lang="fr-FR" b="1" dirty="0"/>
+              <a:t> pull</a:t>
+            </a:r>
+          </a:p>
+          <a:p>
+            <a:pPr lvl="1"/>
+            <a:r>
+              <a:rPr lang="fr-FR" dirty="0"/>
+              <a:t>Ce docker tourne en continu</a:t>
+            </a:r>
+          </a:p>
+          <a:p>
+            <a:pPr lvl="1"/>
+            <a:r>
+              <a:rPr lang="fr-FR" dirty="0"/>
+              <a:t>Gestion des données dans une branche /Prod sous Git</a:t>
+            </a:r>
+          </a:p>
+          <a:p>
+            <a:pPr lvl="1"/>
+            <a:r>
+              <a:rPr lang="fr-FR" sz="2400" dirty="0">
+                <a:solidFill>
+                  <a:schemeClr val="accent5"/>
+                </a:solidFill>
+              </a:rPr>
+              <a:t>/train</a:t>
+            </a:r>
+          </a:p>
+          <a:p>
+            <a:pPr lvl="2"/>
+            <a:r>
+              <a:rPr lang="fr-FR" dirty="0"/>
+              <a:t>Pipeline DVC exécutée avec </a:t>
+            </a:r>
+            <a:r>
+              <a:rPr lang="fr-FR" b="1" dirty="0" err="1"/>
+              <a:t>dvc</a:t>
+            </a:r>
+            <a:r>
+              <a:rPr lang="fr-FR" b="1" dirty="0"/>
+              <a:t> repro</a:t>
+            </a:r>
+          </a:p>
+          <a:p>
+            <a:pPr lvl="2"/>
+            <a:r>
+              <a:rPr lang="en-US" dirty="0" err="1"/>
+              <a:t>dvc</a:t>
+            </a:r>
+            <a:r>
+              <a:rPr lang="en-US" dirty="0"/>
+              <a:t> </a:t>
+            </a:r>
+            <a:r>
+              <a:rPr lang="en-US" b="1" dirty="0"/>
+              <a:t>commit</a:t>
+            </a:r>
+            <a:r>
+              <a:rPr lang="en-US" dirty="0"/>
+              <a:t> / git </a:t>
+            </a:r>
+            <a:r>
+              <a:rPr lang="en-US" b="1" dirty="0"/>
+              <a:t>commit </a:t>
+            </a:r>
+            <a:r>
+              <a:rPr lang="en-US" dirty="0"/>
+              <a:t>/ </a:t>
+            </a:r>
+            <a:r>
+              <a:rPr lang="en-US" dirty="0" err="1"/>
+              <a:t>dvc</a:t>
+            </a:r>
+            <a:r>
+              <a:rPr lang="en-US" dirty="0"/>
+              <a:t> </a:t>
+            </a:r>
+            <a:r>
+              <a:rPr lang="en-US" b="1" dirty="0"/>
+              <a:t>push </a:t>
+            </a:r>
+            <a:r>
+              <a:rPr lang="en-US" dirty="0"/>
+              <a:t>/ git </a:t>
+            </a:r>
+            <a:r>
+              <a:rPr lang="en-US" b="1" dirty="0"/>
+              <a:t>push</a:t>
+            </a:r>
+          </a:p>
+          <a:p>
+            <a:pPr lvl="2"/>
+            <a:r>
+              <a:rPr lang="en-US" dirty="0" err="1"/>
+              <a:t>Récupération</a:t>
+            </a:r>
+            <a:r>
+              <a:rPr lang="en-US" dirty="0"/>
+              <a:t> du Git Hash </a:t>
+            </a:r>
+            <a:r>
+              <a:rPr lang="en-US" dirty="0">
+                <a:sym typeface="Wingdings" panose="05000000000000000000" pitchFamily="2" charset="2"/>
+              </a:rPr>
+              <a:t> Stockage sur</a:t>
+            </a:r>
+            <a:endParaRPr lang="en-US" dirty="0"/>
+          </a:p>
+          <a:p>
+            <a:r>
+              <a:rPr lang="en-US" dirty="0" err="1"/>
+              <a:t>Reproductibilité</a:t>
+            </a:r>
+            <a:r>
+              <a:rPr lang="en-US" dirty="0"/>
+              <a:t> et retour </a:t>
+            </a:r>
+            <a:r>
+              <a:rPr lang="en-US" dirty="0" err="1"/>
+              <a:t>en</a:t>
+            </a:r>
+            <a:r>
+              <a:rPr lang="en-US" dirty="0"/>
+              <a:t> </a:t>
+            </a:r>
+            <a:r>
+              <a:rPr lang="en-US" dirty="0" err="1"/>
+              <a:t>arrière</a:t>
+            </a:r>
+            <a:endParaRPr lang="en-US" dirty="0"/>
+          </a:p>
+          <a:p>
+            <a:pPr lvl="1"/>
+            <a:r>
+              <a:rPr lang="fr-FR" dirty="0"/>
+              <a:t> </a:t>
+            </a:r>
+            <a:r>
+              <a:rPr lang="fr-FR" dirty="0">
+                <a:solidFill>
+                  <a:schemeClr val="accent5"/>
+                </a:solidFill>
+              </a:rPr>
+              <a:t>/</a:t>
+            </a:r>
+            <a:r>
+              <a:rPr lang="fr-FR" dirty="0" err="1">
+                <a:solidFill>
+                  <a:schemeClr val="accent5"/>
+                </a:solidFill>
+              </a:rPr>
+              <a:t>revert_to_commit</a:t>
+            </a:r>
+            <a:r>
+              <a:rPr lang="fr-FR" dirty="0">
+                <a:solidFill>
+                  <a:schemeClr val="accent5"/>
+                </a:solidFill>
+              </a:rPr>
+              <a:t> </a:t>
+            </a:r>
+            <a:r>
+              <a:rPr lang="fr-FR" dirty="0"/>
+              <a:t>restaure le contenu avec git/</a:t>
+            </a:r>
+            <a:r>
+              <a:rPr lang="fr-FR" dirty="0" err="1"/>
+              <a:t>dvc</a:t>
+            </a:r>
+            <a:endParaRPr lang="fr-FR" dirty="0"/>
+          </a:p>
+          <a:p>
+            <a:endParaRPr lang="en-US" dirty="0"/>
+          </a:p>
+          <a:p>
+            <a:pPr lvl="1"/>
+            <a:endParaRPr lang="en-US" b="1" dirty="0"/>
+          </a:p>
+          <a:p>
+            <a:pPr marL="914400" lvl="2" indent="0">
+              <a:buNone/>
+            </a:pPr>
+            <a:endParaRPr lang="fr-FR" dirty="0"/>
+          </a:p>
+          <a:p>
+            <a:pPr lvl="2"/>
+            <a:endParaRPr lang="fr-FR" dirty="0"/>
+          </a:p>
+          <a:p>
+            <a:pPr lvl="2"/>
+            <a:endParaRPr lang="fr-FR" dirty="0"/>
+          </a:p>
+          <a:p>
+            <a:endParaRPr lang="fr-FR" dirty="0"/>
+          </a:p>
+        </p:txBody>
+      </p:sp>
+      <p:pic>
+        <p:nvPicPr>
+          <p:cNvPr id="15" name="Image 14" descr="Une image contenant Police, logo, symbole, Graphique&#10;&#10;Le contenu généré par l’IA peut être incorrect.">
+            <a:extLst>
+              <a:ext uri="{FF2B5EF4-FFF2-40B4-BE49-F238E27FC236}">
+                <a16:creationId xmlns:a16="http://schemas.microsoft.com/office/drawing/2014/main" id="{E0030924-02DA-B594-C11C-D6AC724A83F0}"/>
+              </a:ext>
+            </a:extLst>
+          </p:cNvPr>
+          <p:cNvPicPr>
+            <a:picLocks noChangeAspect="1"/>
+          </p:cNvPicPr>
+          <p:nvPr/>
+        </p:nvPicPr>
+        <p:blipFill>
+          <a:blip r:embed="rId2"/>
+          <a:srcRect l="-3197" t="27080" r="-3106" b="27204"/>
+          <a:stretch/>
+        </p:blipFill>
+        <p:spPr>
+          <a:xfrm>
+            <a:off x="6237925" y="234372"/>
+            <a:ext cx="1170212" cy="503265"/>
+          </a:xfrm>
+          <a:prstGeom prst="rect">
+            <a:avLst/>
+          </a:prstGeom>
+        </p:spPr>
+      </p:pic>
+      <p:pic>
+        <p:nvPicPr>
+          <p:cNvPr id="16" name="Image 15" descr="Une image contenant Graphique, logo, graphisme, Police&#10;&#10;Le contenu généré par l’IA peut être incorrect.">
+            <a:extLst>
+              <a:ext uri="{FF2B5EF4-FFF2-40B4-BE49-F238E27FC236}">
+                <a16:creationId xmlns:a16="http://schemas.microsoft.com/office/drawing/2014/main" id="{5223911B-3BA6-D000-192D-9E012F5D72E6}"/>
+              </a:ext>
+            </a:extLst>
+          </p:cNvPr>
+          <p:cNvPicPr>
+            <a:picLocks noChangeAspect="1"/>
+          </p:cNvPicPr>
+          <p:nvPr/>
+        </p:nvPicPr>
+        <p:blipFill>
+          <a:blip r:embed="rId3"/>
+          <a:srcRect l="30906" t="24775" r="30861" b="29405"/>
+          <a:stretch/>
+        </p:blipFill>
+        <p:spPr>
+          <a:xfrm>
+            <a:off x="7557545" y="178494"/>
+            <a:ext cx="761300" cy="528870"/>
+          </a:xfrm>
+          <a:prstGeom prst="rect">
+            <a:avLst/>
+          </a:prstGeom>
+        </p:spPr>
+      </p:pic>
+      <p:pic>
+        <p:nvPicPr>
+          <p:cNvPr id="18" name="Image 17">
+            <a:extLst>
+              <a:ext uri="{FF2B5EF4-FFF2-40B4-BE49-F238E27FC236}">
+                <a16:creationId xmlns:a16="http://schemas.microsoft.com/office/drawing/2014/main" id="{0406DD96-0D47-0CBB-77CA-0194E6C41A30}"/>
+              </a:ext>
+            </a:extLst>
+          </p:cNvPr>
+          <p:cNvPicPr>
+            <a:picLocks noChangeAspect="1"/>
+          </p:cNvPicPr>
+          <p:nvPr/>
+        </p:nvPicPr>
+        <p:blipFill>
+          <a:blip r:embed="rId4"/>
+          <a:srcRect l="16004" r="6415"/>
+          <a:stretch/>
+        </p:blipFill>
+        <p:spPr>
+          <a:xfrm>
+            <a:off x="9592362" y="33453"/>
+            <a:ext cx="2554664" cy="6824547"/>
+          </a:xfrm>
+          <a:prstGeom prst="rect">
+            <a:avLst/>
+          </a:prstGeom>
+        </p:spPr>
+      </p:pic>
+      <p:grpSp>
+        <p:nvGrpSpPr>
+          <p:cNvPr id="21" name="Groupe 20">
+            <a:extLst>
+              <a:ext uri="{FF2B5EF4-FFF2-40B4-BE49-F238E27FC236}">
+                <a16:creationId xmlns:a16="http://schemas.microsoft.com/office/drawing/2014/main" id="{7B30AE66-1B3D-18C3-0720-D71B6CF6E7ED}"/>
+              </a:ext>
+            </a:extLst>
+          </p:cNvPr>
+          <p:cNvGrpSpPr/>
+          <p:nvPr/>
+        </p:nvGrpSpPr>
+        <p:grpSpPr>
+          <a:xfrm>
+            <a:off x="6771902" y="4550110"/>
+            <a:ext cx="2273149" cy="385902"/>
+            <a:chOff x="8119532" y="4555035"/>
+            <a:chExt cx="2273149" cy="385902"/>
+          </a:xfrm>
+        </p:grpSpPr>
+        <p:pic>
+          <p:nvPicPr>
+            <p:cNvPr id="19" name="Image 18" descr="Une image contenant dessin humoristique, clipart, Police, lapin&#10;&#10;Le contenu généré par l’IA peut être incorrect.">
+              <a:extLst>
+                <a:ext uri="{FF2B5EF4-FFF2-40B4-BE49-F238E27FC236}">
+                  <a16:creationId xmlns:a16="http://schemas.microsoft.com/office/drawing/2014/main" id="{3F7CA652-F17D-35D5-4835-FA02462BFC9E}"/>
+                </a:ext>
+              </a:extLst>
+            </p:cNvPr>
+            <p:cNvPicPr>
+              <a:picLocks noChangeAspect="1"/>
+            </p:cNvPicPr>
+            <p:nvPr/>
+          </p:nvPicPr>
+          <p:blipFill>
+            <a:blip r:embed="rId5"/>
+            <a:stretch>
+              <a:fillRect/>
+            </a:stretch>
+          </p:blipFill>
+          <p:spPr>
+            <a:xfrm>
+              <a:off x="9110493" y="4555035"/>
+              <a:ext cx="1282188" cy="366339"/>
+            </a:xfrm>
+            <a:prstGeom prst="rect">
+              <a:avLst/>
+            </a:prstGeom>
+          </p:spPr>
+        </p:pic>
+        <p:pic>
+          <p:nvPicPr>
+            <p:cNvPr id="20" name="Image 19" descr="Une image contenant Police, Graphique, graphisme, logo&#10;&#10;Le contenu généré par l’IA peut être incorrect.">
+              <a:extLst>
+                <a:ext uri="{FF2B5EF4-FFF2-40B4-BE49-F238E27FC236}">
+                  <a16:creationId xmlns:a16="http://schemas.microsoft.com/office/drawing/2014/main" id="{EEC13E4E-E6F5-4528-F434-190F4B708E84}"/>
+                </a:ext>
+              </a:extLst>
+            </p:cNvPr>
+            <p:cNvPicPr>
+              <a:picLocks noChangeAspect="1"/>
+            </p:cNvPicPr>
+            <p:nvPr/>
+          </p:nvPicPr>
+          <p:blipFill>
+            <a:blip r:embed="rId6"/>
+            <a:stretch>
+              <a:fillRect/>
+            </a:stretch>
+          </p:blipFill>
+          <p:spPr>
+            <a:xfrm>
+              <a:off x="8119532" y="4574598"/>
+              <a:ext cx="999108" cy="366339"/>
+            </a:xfrm>
+            <a:prstGeom prst="rect">
+              <a:avLst/>
+            </a:prstGeom>
+          </p:spPr>
+        </p:pic>
+      </p:grpSp>
+      <p:grpSp>
+        <p:nvGrpSpPr>
+          <p:cNvPr id="22" name="Groupe 21">
+            <a:extLst>
+              <a:ext uri="{FF2B5EF4-FFF2-40B4-BE49-F238E27FC236}">
+                <a16:creationId xmlns:a16="http://schemas.microsoft.com/office/drawing/2014/main" id="{96043283-506B-E612-EC0E-FFFFD84A3A5C}"/>
+              </a:ext>
+            </a:extLst>
+          </p:cNvPr>
+          <p:cNvGrpSpPr/>
+          <p:nvPr/>
+        </p:nvGrpSpPr>
+        <p:grpSpPr>
+          <a:xfrm>
+            <a:off x="9765970" y="1363176"/>
+            <a:ext cx="982641" cy="969486"/>
+            <a:chOff x="3724650" y="3670213"/>
+            <a:chExt cx="982641" cy="969486"/>
+          </a:xfrm>
+        </p:grpSpPr>
+        <p:sp>
+          <p:nvSpPr>
+            <p:cNvPr id="23" name="ZoneTexte 22">
+              <a:extLst>
+                <a:ext uri="{FF2B5EF4-FFF2-40B4-BE49-F238E27FC236}">
+                  <a16:creationId xmlns:a16="http://schemas.microsoft.com/office/drawing/2014/main" id="{1C4A2E10-5A11-935B-D37D-90D5248488AF}"/>
+                </a:ext>
+              </a:extLst>
+            </p:cNvPr>
+            <p:cNvSpPr txBox="1"/>
+            <p:nvPr/>
+          </p:nvSpPr>
+          <p:spPr>
+            <a:xfrm>
+              <a:off x="3724650" y="3670213"/>
+              <a:ext cx="982641" cy="276999"/>
+            </a:xfrm>
+            <a:prstGeom prst="rect">
+              <a:avLst/>
+            </a:prstGeom>
+            <a:solidFill>
+              <a:schemeClr val="bg1"/>
+            </a:solidFill>
+          </p:spPr>
+          <p:txBody>
+            <a:bodyPr wrap="none" rtlCol="0">
+              <a:spAutoFit/>
+            </a:bodyPr>
+            <a:lstStyle/>
+            <a:p>
+              <a:r>
+                <a:rPr lang="fr-FR" sz="1200" dirty="0" err="1">
+                  <a:solidFill>
+                    <a:schemeClr val="accent6">
+                      <a:lumMod val="75000"/>
+                    </a:schemeClr>
+                  </a:solidFill>
+                </a:rPr>
+                <a:t>Ocerized</a:t>
+              </a:r>
+              <a:r>
+                <a:rPr lang="fr-FR" sz="1200" dirty="0">
+                  <a:solidFill>
+                    <a:schemeClr val="accent6">
+                      <a:lumMod val="75000"/>
+                    </a:schemeClr>
+                  </a:solidFill>
+                </a:rPr>
+                <a:t> txt</a:t>
+              </a:r>
+            </a:p>
+          </p:txBody>
+        </p:sp>
+        <p:pic>
+          <p:nvPicPr>
+            <p:cNvPr id="24" name="Graphique 23" descr="Base de données avec un remplissage uni">
+              <a:extLst>
+                <a:ext uri="{FF2B5EF4-FFF2-40B4-BE49-F238E27FC236}">
+                  <a16:creationId xmlns:a16="http://schemas.microsoft.com/office/drawing/2014/main" id="{A0771888-FA3D-2ED4-137E-544CAB3F3645}"/>
+                </a:ext>
+              </a:extLst>
+            </p:cNvPr>
+            <p:cNvPicPr>
+              <a:picLocks noChangeAspect="1"/>
+            </p:cNvPicPr>
+            <p:nvPr/>
+          </p:nvPicPr>
+          <p:blipFill>
+            <a:blip r:embed="rId7">
+              <a:extLst>
+                <a:ext uri="{96DAC541-7B7A-43D3-8B79-37D633B846F1}">
+                  <asvg:svgBlip xmlns:asvg="http://schemas.microsoft.com/office/drawing/2016/SVG/main" r:embed="rId8"/>
+                </a:ext>
+              </a:extLst>
+            </a:blip>
+            <a:stretch>
+              <a:fillRect/>
+            </a:stretch>
+          </p:blipFill>
+          <p:spPr>
+            <a:xfrm>
+              <a:off x="3823097" y="3917546"/>
+              <a:ext cx="722153" cy="722153"/>
+            </a:xfrm>
+            <a:prstGeom prst="rect">
+              <a:avLst/>
+            </a:prstGeom>
+          </p:spPr>
+        </p:pic>
+      </p:grpSp>
+      <p:grpSp>
+        <p:nvGrpSpPr>
+          <p:cNvPr id="25" name="Groupe 24">
+            <a:extLst>
+              <a:ext uri="{FF2B5EF4-FFF2-40B4-BE49-F238E27FC236}">
+                <a16:creationId xmlns:a16="http://schemas.microsoft.com/office/drawing/2014/main" id="{1473BFCA-3339-4B0B-4BB5-BC82A073E424}"/>
+              </a:ext>
+            </a:extLst>
+          </p:cNvPr>
+          <p:cNvGrpSpPr/>
+          <p:nvPr/>
+        </p:nvGrpSpPr>
+        <p:grpSpPr>
+          <a:xfrm>
+            <a:off x="9820267" y="329583"/>
+            <a:ext cx="736757" cy="896929"/>
+            <a:chOff x="418605" y="3671742"/>
+            <a:chExt cx="736757" cy="896929"/>
+          </a:xfrm>
+        </p:grpSpPr>
+        <p:pic>
+          <p:nvPicPr>
+            <p:cNvPr id="26" name="Graphique 25" descr="Base de données avec un remplissage uni">
+              <a:extLst>
+                <a:ext uri="{FF2B5EF4-FFF2-40B4-BE49-F238E27FC236}">
+                  <a16:creationId xmlns:a16="http://schemas.microsoft.com/office/drawing/2014/main" id="{ECAC4365-8445-6A22-6882-CD8B9D8213ED}"/>
+                </a:ext>
+              </a:extLst>
+            </p:cNvPr>
+            <p:cNvPicPr>
+              <a:picLocks noChangeAspect="1"/>
+            </p:cNvPicPr>
+            <p:nvPr/>
+          </p:nvPicPr>
+          <p:blipFill>
+            <a:blip r:embed="rId7">
+              <a:extLst>
+                <a:ext uri="{96DAC541-7B7A-43D3-8B79-37D633B846F1}">
+                  <asvg:svgBlip xmlns:asvg="http://schemas.microsoft.com/office/drawing/2016/SVG/main" r:embed="rId9"/>
+                </a:ext>
+              </a:extLst>
+            </a:blip>
+            <a:stretch>
+              <a:fillRect/>
+            </a:stretch>
+          </p:blipFill>
+          <p:spPr>
+            <a:xfrm>
+              <a:off x="433209" y="3846518"/>
+              <a:ext cx="722153" cy="722153"/>
+            </a:xfrm>
+            <a:prstGeom prst="rect">
+              <a:avLst/>
+            </a:prstGeom>
+          </p:spPr>
+        </p:pic>
+        <p:sp>
+          <p:nvSpPr>
+            <p:cNvPr id="27" name="ZoneTexte 26">
+              <a:extLst>
+                <a:ext uri="{FF2B5EF4-FFF2-40B4-BE49-F238E27FC236}">
+                  <a16:creationId xmlns:a16="http://schemas.microsoft.com/office/drawing/2014/main" id="{4FED59BB-3FFB-75BB-AFD2-1A1631C76E54}"/>
+                </a:ext>
+              </a:extLst>
+            </p:cNvPr>
+            <p:cNvSpPr txBox="1"/>
+            <p:nvPr/>
+          </p:nvSpPr>
+          <p:spPr>
+            <a:xfrm>
+              <a:off x="418605" y="3671742"/>
+              <a:ext cx="667170" cy="276999"/>
+            </a:xfrm>
+            <a:prstGeom prst="rect">
+              <a:avLst/>
+            </a:prstGeom>
+            <a:noFill/>
+          </p:spPr>
+          <p:txBody>
+            <a:bodyPr wrap="none" rtlCol="0">
+              <a:spAutoFit/>
+            </a:bodyPr>
+            <a:lstStyle/>
+            <a:p>
+              <a:r>
+                <a:rPr lang="fr-FR" sz="1200" dirty="0">
+                  <a:solidFill>
+                    <a:schemeClr val="accent6">
+                      <a:lumMod val="75000"/>
+                    </a:schemeClr>
+                  </a:solidFill>
+                </a:rPr>
+                <a:t>images</a:t>
+              </a:r>
+            </a:p>
+          </p:txBody>
+        </p:sp>
+      </p:grpSp>
+      <p:grpSp>
+        <p:nvGrpSpPr>
+          <p:cNvPr id="28" name="Groupe 27">
+            <a:extLst>
+              <a:ext uri="{FF2B5EF4-FFF2-40B4-BE49-F238E27FC236}">
+                <a16:creationId xmlns:a16="http://schemas.microsoft.com/office/drawing/2014/main" id="{D150C14D-5B90-4DCE-9F5F-157E8517797E}"/>
+              </a:ext>
+            </a:extLst>
+          </p:cNvPr>
+          <p:cNvGrpSpPr/>
+          <p:nvPr/>
+        </p:nvGrpSpPr>
+        <p:grpSpPr>
+          <a:xfrm>
+            <a:off x="10286479" y="4209582"/>
+            <a:ext cx="865173" cy="884775"/>
+            <a:chOff x="5074635" y="5243008"/>
+            <a:chExt cx="865173" cy="884775"/>
+          </a:xfrm>
+        </p:grpSpPr>
+        <p:pic>
+          <p:nvPicPr>
+            <p:cNvPr id="29" name="Graphique 28" descr="Base de données avec un remplissage uni">
+              <a:extLst>
+                <a:ext uri="{FF2B5EF4-FFF2-40B4-BE49-F238E27FC236}">
+                  <a16:creationId xmlns:a16="http://schemas.microsoft.com/office/drawing/2014/main" id="{78DB0856-3288-477F-ABB0-C3EBD018444B}"/>
+                </a:ext>
+              </a:extLst>
+            </p:cNvPr>
+            <p:cNvPicPr>
+              <a:picLocks noChangeAspect="1"/>
+            </p:cNvPicPr>
+            <p:nvPr/>
+          </p:nvPicPr>
+          <p:blipFill>
+            <a:blip r:embed="rId7">
+              <a:extLst>
+                <a:ext uri="{96DAC541-7B7A-43D3-8B79-37D633B846F1}">
+                  <asvg:svgBlip xmlns:asvg="http://schemas.microsoft.com/office/drawing/2016/SVG/main" r:embed="rId8"/>
+                </a:ext>
+              </a:extLst>
+            </a:blip>
+            <a:stretch>
+              <a:fillRect/>
+            </a:stretch>
+          </p:blipFill>
+          <p:spPr>
+            <a:xfrm>
+              <a:off x="5175691" y="5405630"/>
+              <a:ext cx="722153" cy="722153"/>
+            </a:xfrm>
+            <a:prstGeom prst="rect">
+              <a:avLst/>
+            </a:prstGeom>
+          </p:spPr>
+        </p:pic>
+        <p:sp>
+          <p:nvSpPr>
+            <p:cNvPr id="30" name="ZoneTexte 29">
+              <a:extLst>
+                <a:ext uri="{FF2B5EF4-FFF2-40B4-BE49-F238E27FC236}">
+                  <a16:creationId xmlns:a16="http://schemas.microsoft.com/office/drawing/2014/main" id="{EC689107-55B2-6542-EFA9-4F03011A0D32}"/>
+                </a:ext>
+              </a:extLst>
+            </p:cNvPr>
+            <p:cNvSpPr txBox="1"/>
+            <p:nvPr/>
+          </p:nvSpPr>
+          <p:spPr>
+            <a:xfrm>
+              <a:off x="5074635" y="5243008"/>
+              <a:ext cx="865173" cy="276999"/>
+            </a:xfrm>
+            <a:prstGeom prst="rect">
+              <a:avLst/>
+            </a:prstGeom>
+            <a:noFill/>
+          </p:spPr>
+          <p:txBody>
+            <a:bodyPr wrap="none" rtlCol="0">
+              <a:spAutoFit/>
+            </a:bodyPr>
+            <a:lstStyle/>
+            <a:p>
+              <a:r>
+                <a:rPr lang="fr-FR" sz="1200" dirty="0">
+                  <a:solidFill>
+                    <a:schemeClr val="accent6">
+                      <a:lumMod val="75000"/>
+                    </a:schemeClr>
+                  </a:solidFill>
+                </a:rPr>
+                <a:t>Train data</a:t>
+              </a:r>
+            </a:p>
+          </p:txBody>
+        </p:sp>
+      </p:grpSp>
+      <p:grpSp>
+        <p:nvGrpSpPr>
+          <p:cNvPr id="31" name="Groupe 30">
+            <a:extLst>
+              <a:ext uri="{FF2B5EF4-FFF2-40B4-BE49-F238E27FC236}">
+                <a16:creationId xmlns:a16="http://schemas.microsoft.com/office/drawing/2014/main" id="{5698F6D0-4A71-CD9D-6F3D-064C40CF9500}"/>
+              </a:ext>
+            </a:extLst>
+          </p:cNvPr>
+          <p:cNvGrpSpPr/>
+          <p:nvPr/>
+        </p:nvGrpSpPr>
+        <p:grpSpPr>
+          <a:xfrm>
+            <a:off x="11543723" y="5163778"/>
+            <a:ext cx="722153" cy="943256"/>
+            <a:chOff x="7742702" y="3541388"/>
+            <a:chExt cx="722153" cy="943256"/>
+          </a:xfrm>
+        </p:grpSpPr>
+        <p:pic>
+          <p:nvPicPr>
+            <p:cNvPr id="32" name="Graphique 31" descr="Base de données avec un remplissage uni">
+              <a:extLst>
+                <a:ext uri="{FF2B5EF4-FFF2-40B4-BE49-F238E27FC236}">
+                  <a16:creationId xmlns:a16="http://schemas.microsoft.com/office/drawing/2014/main" id="{1AA52FED-334F-517C-4D73-A2B65CC46145}"/>
+                </a:ext>
+              </a:extLst>
+            </p:cNvPr>
+            <p:cNvPicPr>
+              <a:picLocks noChangeAspect="1"/>
+            </p:cNvPicPr>
+            <p:nvPr/>
+          </p:nvPicPr>
+          <p:blipFill>
+            <a:blip r:embed="rId7">
+              <a:extLst>
+                <a:ext uri="{96DAC541-7B7A-43D3-8B79-37D633B846F1}">
+                  <asvg:svgBlip xmlns:asvg="http://schemas.microsoft.com/office/drawing/2016/SVG/main" r:embed="rId8"/>
+                </a:ext>
+              </a:extLst>
+            </a:blip>
+            <a:stretch>
+              <a:fillRect/>
+            </a:stretch>
+          </p:blipFill>
+          <p:spPr>
+            <a:xfrm>
+              <a:off x="7742702" y="3762491"/>
+              <a:ext cx="722153" cy="722153"/>
+            </a:xfrm>
+            <a:prstGeom prst="rect">
+              <a:avLst/>
+            </a:prstGeom>
+          </p:spPr>
+        </p:pic>
+        <p:sp>
+          <p:nvSpPr>
+            <p:cNvPr id="33" name="ZoneTexte 32">
+              <a:extLst>
+                <a:ext uri="{FF2B5EF4-FFF2-40B4-BE49-F238E27FC236}">
+                  <a16:creationId xmlns:a16="http://schemas.microsoft.com/office/drawing/2014/main" id="{72786D1A-DD60-D1D1-58CA-F98BF4E7C730}"/>
+                </a:ext>
+              </a:extLst>
+            </p:cNvPr>
+            <p:cNvSpPr txBox="1"/>
+            <p:nvPr/>
+          </p:nvSpPr>
+          <p:spPr>
+            <a:xfrm>
+              <a:off x="7763512" y="3541388"/>
+              <a:ext cx="596253" cy="276999"/>
+            </a:xfrm>
+            <a:prstGeom prst="rect">
+              <a:avLst/>
+            </a:prstGeom>
+            <a:noFill/>
+          </p:spPr>
+          <p:txBody>
+            <a:bodyPr wrap="none" rtlCol="0">
+              <a:spAutoFit/>
+            </a:bodyPr>
+            <a:lstStyle/>
+            <a:p>
+              <a:r>
+                <a:rPr lang="fr-FR" sz="1200" dirty="0">
+                  <a:solidFill>
+                    <a:schemeClr val="accent6">
+                      <a:lumMod val="75000"/>
+                    </a:schemeClr>
+                  </a:solidFill>
+                </a:rPr>
+                <a:t>Model</a:t>
+              </a:r>
+            </a:p>
+          </p:txBody>
+        </p:sp>
+      </p:grpSp>
+      <p:grpSp>
+        <p:nvGrpSpPr>
+          <p:cNvPr id="34" name="Groupe 33">
+            <a:extLst>
+              <a:ext uri="{FF2B5EF4-FFF2-40B4-BE49-F238E27FC236}">
+                <a16:creationId xmlns:a16="http://schemas.microsoft.com/office/drawing/2014/main" id="{83C62F6B-04BA-8E02-89E0-A1C3B9B4CF20}"/>
+              </a:ext>
+            </a:extLst>
+          </p:cNvPr>
+          <p:cNvGrpSpPr/>
+          <p:nvPr/>
+        </p:nvGrpSpPr>
+        <p:grpSpPr>
+          <a:xfrm>
+            <a:off x="8959415" y="5942687"/>
+            <a:ext cx="722153" cy="979233"/>
+            <a:chOff x="9474411" y="3573862"/>
+            <a:chExt cx="722153" cy="979233"/>
+          </a:xfrm>
+        </p:grpSpPr>
+        <p:pic>
+          <p:nvPicPr>
+            <p:cNvPr id="35" name="Graphique 34" descr="Base de données avec un remplissage uni">
+              <a:extLst>
+                <a:ext uri="{FF2B5EF4-FFF2-40B4-BE49-F238E27FC236}">
+                  <a16:creationId xmlns:a16="http://schemas.microsoft.com/office/drawing/2014/main" id="{19897385-430E-7803-E51D-DB9D7A7E67F9}"/>
+                </a:ext>
+              </a:extLst>
+            </p:cNvPr>
+            <p:cNvPicPr>
+              <a:picLocks noChangeAspect="1"/>
+            </p:cNvPicPr>
+            <p:nvPr/>
+          </p:nvPicPr>
+          <p:blipFill>
+            <a:blip r:embed="rId7">
+              <a:extLst>
+                <a:ext uri="{96DAC541-7B7A-43D3-8B79-37D633B846F1}">
+                  <asvg:svgBlip xmlns:asvg="http://schemas.microsoft.com/office/drawing/2016/SVG/main" r:embed="rId8"/>
+                </a:ext>
+              </a:extLst>
+            </a:blip>
+            <a:stretch>
+              <a:fillRect/>
+            </a:stretch>
+          </p:blipFill>
+          <p:spPr>
+            <a:xfrm>
+              <a:off x="9474411" y="3830942"/>
+              <a:ext cx="722153" cy="722153"/>
+            </a:xfrm>
+            <a:prstGeom prst="rect">
+              <a:avLst/>
+            </a:prstGeom>
+          </p:spPr>
+        </p:pic>
+        <p:sp>
+          <p:nvSpPr>
+            <p:cNvPr id="36" name="ZoneTexte 35">
+              <a:extLst>
+                <a:ext uri="{FF2B5EF4-FFF2-40B4-BE49-F238E27FC236}">
+                  <a16:creationId xmlns:a16="http://schemas.microsoft.com/office/drawing/2014/main" id="{6ACCEF71-4188-E1F9-BF4A-47AA93144002}"/>
+                </a:ext>
+              </a:extLst>
+            </p:cNvPr>
+            <p:cNvSpPr txBox="1"/>
+            <p:nvPr/>
+          </p:nvSpPr>
+          <p:spPr>
+            <a:xfrm>
+              <a:off x="9502126" y="3573862"/>
+              <a:ext cx="672428" cy="276999"/>
+            </a:xfrm>
+            <a:prstGeom prst="rect">
+              <a:avLst/>
+            </a:prstGeom>
+            <a:noFill/>
+          </p:spPr>
+          <p:txBody>
+            <a:bodyPr wrap="none" rtlCol="0">
+              <a:spAutoFit/>
+            </a:bodyPr>
+            <a:lstStyle/>
+            <a:p>
+              <a:r>
+                <a:rPr lang="fr-FR" sz="1200" dirty="0" err="1">
+                  <a:solidFill>
+                    <a:schemeClr val="accent6">
+                      <a:lumMod val="75000"/>
+                    </a:schemeClr>
+                  </a:solidFill>
+                </a:rPr>
+                <a:t>Metrics</a:t>
+              </a:r>
+              <a:endParaRPr lang="fr-FR" sz="1200" dirty="0">
+                <a:solidFill>
+                  <a:schemeClr val="accent6">
+                    <a:lumMod val="75000"/>
+                  </a:schemeClr>
+                </a:solidFill>
+              </a:endParaRPr>
+            </a:p>
+          </p:txBody>
+        </p:sp>
+      </p:grpSp>
+      <p:grpSp>
+        <p:nvGrpSpPr>
+          <p:cNvPr id="37" name="Groupe 36">
+            <a:extLst>
+              <a:ext uri="{FF2B5EF4-FFF2-40B4-BE49-F238E27FC236}">
+                <a16:creationId xmlns:a16="http://schemas.microsoft.com/office/drawing/2014/main" id="{DCAD0582-F1A1-9BF5-2162-5F8968EA75AB}"/>
+              </a:ext>
+            </a:extLst>
+          </p:cNvPr>
+          <p:cNvGrpSpPr/>
+          <p:nvPr/>
+        </p:nvGrpSpPr>
+        <p:grpSpPr>
+          <a:xfrm>
+            <a:off x="9106953" y="4614344"/>
+            <a:ext cx="804195" cy="936230"/>
+            <a:chOff x="5075960" y="5451419"/>
+            <a:chExt cx="804195" cy="936230"/>
+          </a:xfrm>
+        </p:grpSpPr>
+        <p:pic>
+          <p:nvPicPr>
+            <p:cNvPr id="38" name="Graphique 37" descr="Base de données avec un remplissage uni">
+              <a:extLst>
+                <a:ext uri="{FF2B5EF4-FFF2-40B4-BE49-F238E27FC236}">
+                  <a16:creationId xmlns:a16="http://schemas.microsoft.com/office/drawing/2014/main" id="{0CE6DA26-C592-43C9-4E6E-40DE036FA1AD}"/>
+                </a:ext>
+              </a:extLst>
+            </p:cNvPr>
+            <p:cNvPicPr>
+              <a:picLocks noChangeAspect="1"/>
+            </p:cNvPicPr>
+            <p:nvPr/>
+          </p:nvPicPr>
+          <p:blipFill>
+            <a:blip r:embed="rId7">
+              <a:extLst>
+                <a:ext uri="{96DAC541-7B7A-43D3-8B79-37D633B846F1}">
+                  <asvg:svgBlip xmlns:asvg="http://schemas.microsoft.com/office/drawing/2016/SVG/main" r:embed="rId8"/>
+                </a:ext>
+              </a:extLst>
+            </a:blip>
+            <a:stretch>
+              <a:fillRect/>
+            </a:stretch>
+          </p:blipFill>
+          <p:spPr>
+            <a:xfrm>
+              <a:off x="5151298" y="5665496"/>
+              <a:ext cx="722153" cy="722153"/>
+            </a:xfrm>
+            <a:prstGeom prst="rect">
+              <a:avLst/>
+            </a:prstGeom>
+          </p:spPr>
+        </p:pic>
+        <p:sp>
+          <p:nvSpPr>
+            <p:cNvPr id="39" name="ZoneTexte 38">
+              <a:extLst>
+                <a:ext uri="{FF2B5EF4-FFF2-40B4-BE49-F238E27FC236}">
+                  <a16:creationId xmlns:a16="http://schemas.microsoft.com/office/drawing/2014/main" id="{30A5AE36-18F6-04FF-E42A-934F34DB6D48}"/>
+                </a:ext>
+              </a:extLst>
+            </p:cNvPr>
+            <p:cNvSpPr txBox="1"/>
+            <p:nvPr/>
+          </p:nvSpPr>
+          <p:spPr>
+            <a:xfrm>
+              <a:off x="5075960" y="5451419"/>
+              <a:ext cx="804195" cy="276999"/>
+            </a:xfrm>
+            <a:prstGeom prst="rect">
+              <a:avLst/>
+            </a:prstGeom>
+            <a:noFill/>
+          </p:spPr>
+          <p:txBody>
+            <a:bodyPr wrap="none" rtlCol="0">
+              <a:spAutoFit/>
+            </a:bodyPr>
+            <a:lstStyle/>
+            <a:p>
+              <a:r>
+                <a:rPr lang="fr-FR" sz="1200" dirty="0">
+                  <a:solidFill>
+                    <a:schemeClr val="accent6">
+                      <a:lumMod val="75000"/>
+                    </a:schemeClr>
+                  </a:solidFill>
+                </a:rPr>
+                <a:t>Test data</a:t>
+              </a:r>
+            </a:p>
+          </p:txBody>
+        </p:sp>
+      </p:grpSp>
+      <p:grpSp>
+        <p:nvGrpSpPr>
+          <p:cNvPr id="40" name="Groupe 39">
+            <a:extLst>
+              <a:ext uri="{FF2B5EF4-FFF2-40B4-BE49-F238E27FC236}">
+                <a16:creationId xmlns:a16="http://schemas.microsoft.com/office/drawing/2014/main" id="{4BD7082C-56E7-BBB4-847B-EBD2A36BCBB6}"/>
+              </a:ext>
+            </a:extLst>
+          </p:cNvPr>
+          <p:cNvGrpSpPr/>
+          <p:nvPr/>
+        </p:nvGrpSpPr>
+        <p:grpSpPr>
+          <a:xfrm>
+            <a:off x="11454268" y="4093666"/>
+            <a:ext cx="837602" cy="919381"/>
+            <a:chOff x="5074636" y="5208402"/>
+            <a:chExt cx="837602" cy="919381"/>
+          </a:xfrm>
+        </p:grpSpPr>
+        <p:pic>
+          <p:nvPicPr>
+            <p:cNvPr id="41" name="Graphique 40" descr="Base de données avec un remplissage uni">
+              <a:extLst>
+                <a:ext uri="{FF2B5EF4-FFF2-40B4-BE49-F238E27FC236}">
+                  <a16:creationId xmlns:a16="http://schemas.microsoft.com/office/drawing/2014/main" id="{FA0CDBCA-EC47-830B-5192-CD37FA086BA7}"/>
+                </a:ext>
+              </a:extLst>
+            </p:cNvPr>
+            <p:cNvPicPr>
+              <a:picLocks noChangeAspect="1"/>
+            </p:cNvPicPr>
+            <p:nvPr/>
+          </p:nvPicPr>
+          <p:blipFill>
+            <a:blip r:embed="rId7">
+              <a:extLst>
+                <a:ext uri="{96DAC541-7B7A-43D3-8B79-37D633B846F1}">
+                  <asvg:svgBlip xmlns:asvg="http://schemas.microsoft.com/office/drawing/2016/SVG/main" r:embed="rId8"/>
+                </a:ext>
+              </a:extLst>
+            </a:blip>
+            <a:stretch>
+              <a:fillRect/>
+            </a:stretch>
+          </p:blipFill>
+          <p:spPr>
+            <a:xfrm>
+              <a:off x="5175691" y="5405630"/>
+              <a:ext cx="722153" cy="722153"/>
+            </a:xfrm>
+            <a:prstGeom prst="rect">
+              <a:avLst/>
+            </a:prstGeom>
+          </p:spPr>
+        </p:pic>
+        <p:sp>
+          <p:nvSpPr>
+            <p:cNvPr id="42" name="ZoneTexte 41">
+              <a:extLst>
+                <a:ext uri="{FF2B5EF4-FFF2-40B4-BE49-F238E27FC236}">
+                  <a16:creationId xmlns:a16="http://schemas.microsoft.com/office/drawing/2014/main" id="{3EF40398-B86A-0A45-2C15-758AE4400023}"/>
+                </a:ext>
+              </a:extLst>
+            </p:cNvPr>
+            <p:cNvSpPr txBox="1"/>
+            <p:nvPr/>
+          </p:nvSpPr>
+          <p:spPr>
+            <a:xfrm>
+              <a:off x="5074636" y="5208402"/>
+              <a:ext cx="837602" cy="276999"/>
+            </a:xfrm>
+            <a:prstGeom prst="rect">
+              <a:avLst/>
+            </a:prstGeom>
+            <a:noFill/>
+          </p:spPr>
+          <p:txBody>
+            <a:bodyPr wrap="none" rtlCol="0">
+              <a:spAutoFit/>
+            </a:bodyPr>
+            <a:lstStyle/>
+            <a:p>
+              <a:r>
+                <a:rPr lang="fr-FR" sz="1200" dirty="0" err="1">
+                  <a:solidFill>
+                    <a:schemeClr val="accent6">
+                      <a:lumMod val="75000"/>
+                    </a:schemeClr>
+                  </a:solidFill>
+                </a:rPr>
+                <a:t>Vectorizer</a:t>
+              </a:r>
+              <a:endParaRPr lang="fr-FR" sz="1200" dirty="0">
+                <a:solidFill>
+                  <a:schemeClr val="accent6">
+                    <a:lumMod val="75000"/>
+                  </a:schemeClr>
+                </a:solidFill>
+              </a:endParaRPr>
+            </a:p>
+          </p:txBody>
+        </p:sp>
+      </p:grpSp>
+      <p:grpSp>
+        <p:nvGrpSpPr>
+          <p:cNvPr id="43" name="Groupe 42">
+            <a:extLst>
+              <a:ext uri="{FF2B5EF4-FFF2-40B4-BE49-F238E27FC236}">
+                <a16:creationId xmlns:a16="http://schemas.microsoft.com/office/drawing/2014/main" id="{25E5F32D-3132-E937-BD07-34B479C84C66}"/>
+              </a:ext>
+            </a:extLst>
+          </p:cNvPr>
+          <p:cNvGrpSpPr/>
+          <p:nvPr/>
+        </p:nvGrpSpPr>
+        <p:grpSpPr>
+          <a:xfrm>
+            <a:off x="9783410" y="2597667"/>
+            <a:ext cx="947760" cy="912376"/>
+            <a:chOff x="3619236" y="3678454"/>
+            <a:chExt cx="947760" cy="912376"/>
+          </a:xfrm>
+        </p:grpSpPr>
+        <p:sp>
+          <p:nvSpPr>
+            <p:cNvPr id="44" name="ZoneTexte 43">
+              <a:extLst>
+                <a:ext uri="{FF2B5EF4-FFF2-40B4-BE49-F238E27FC236}">
+                  <a16:creationId xmlns:a16="http://schemas.microsoft.com/office/drawing/2014/main" id="{90770276-AE71-1A54-ABD4-968AF8DA73B6}"/>
+                </a:ext>
+              </a:extLst>
+            </p:cNvPr>
+            <p:cNvSpPr txBox="1"/>
+            <p:nvPr/>
+          </p:nvSpPr>
+          <p:spPr>
+            <a:xfrm>
+              <a:off x="3619236" y="3678454"/>
+              <a:ext cx="947760" cy="276999"/>
+            </a:xfrm>
+            <a:prstGeom prst="rect">
+              <a:avLst/>
+            </a:prstGeom>
+            <a:solidFill>
+              <a:schemeClr val="bg1"/>
+            </a:solidFill>
+          </p:spPr>
+          <p:txBody>
+            <a:bodyPr wrap="none" rtlCol="0">
+              <a:spAutoFit/>
+            </a:bodyPr>
+            <a:lstStyle/>
+            <a:p>
+              <a:r>
+                <a:rPr lang="fr-FR" sz="1200" dirty="0" err="1">
+                  <a:solidFill>
+                    <a:schemeClr val="accent6">
+                      <a:lumMod val="75000"/>
+                    </a:schemeClr>
+                  </a:solidFill>
+                </a:rPr>
+                <a:t>Cleaned</a:t>
+              </a:r>
+              <a:r>
+                <a:rPr lang="fr-FR" sz="1200" dirty="0">
+                  <a:solidFill>
+                    <a:schemeClr val="accent6">
+                      <a:lumMod val="75000"/>
+                    </a:schemeClr>
+                  </a:solidFill>
+                </a:rPr>
+                <a:t> txt</a:t>
+              </a:r>
+            </a:p>
+          </p:txBody>
+        </p:sp>
+        <p:pic>
+          <p:nvPicPr>
+            <p:cNvPr id="45" name="Graphique 44" descr="Base de données avec un remplissage uni">
+              <a:extLst>
+                <a:ext uri="{FF2B5EF4-FFF2-40B4-BE49-F238E27FC236}">
+                  <a16:creationId xmlns:a16="http://schemas.microsoft.com/office/drawing/2014/main" id="{F17238C7-9B9F-CAC0-89A1-EB76A44CB10F}"/>
+                </a:ext>
+              </a:extLst>
+            </p:cNvPr>
+            <p:cNvPicPr>
+              <a:picLocks noChangeAspect="1"/>
+            </p:cNvPicPr>
+            <p:nvPr/>
+          </p:nvPicPr>
+          <p:blipFill>
+            <a:blip r:embed="rId7">
+              <a:extLst>
+                <a:ext uri="{96DAC541-7B7A-43D3-8B79-37D633B846F1}">
+                  <asvg:svgBlip xmlns:asvg="http://schemas.microsoft.com/office/drawing/2016/SVG/main" r:embed="rId8"/>
+                </a:ext>
+              </a:extLst>
+            </a:blip>
+            <a:stretch>
+              <a:fillRect/>
+            </a:stretch>
+          </p:blipFill>
+          <p:spPr>
+            <a:xfrm>
+              <a:off x="3732039" y="3868677"/>
+              <a:ext cx="722153" cy="722153"/>
+            </a:xfrm>
+            <a:prstGeom prst="rect">
+              <a:avLst/>
+            </a:prstGeom>
+          </p:spPr>
+        </p:pic>
+      </p:grpSp>
+    </p:spTree>
+    <p:extLst>
+      <p:ext uri="{BB962C8B-B14F-4D97-AF65-F5344CB8AC3E}">
+        <p14:creationId xmlns:p14="http://schemas.microsoft.com/office/powerpoint/2010/main" val="3653425637"/>
+      </p:ext>
+    </p:extLst>
+  </p:cSld>
+  <p:clrMapOvr>
+    <a:masterClrMapping/>
+  </p:clrMapOvr>
+</p:sld>
+</file>
+
+<file path=ppt/slides/slide4.xml><?xml version="1.0" encoding="utf-8"?>
+<p:sld xmlns:a="http://schemas.openxmlformats.org/drawingml/2006/main" xmlns:r="http://schemas.openxmlformats.org/officeDocument/2006/relationships" xmlns:p="http://schemas.openxmlformats.org/presentationml/2006/main">
+  <p:cSld>
+    <p:spTree>
+      <p:nvGrpSpPr>
+        <p:cNvPr id="1" name="">
+          <a:extLst>
+            <a:ext uri="{FF2B5EF4-FFF2-40B4-BE49-F238E27FC236}">
+              <a16:creationId xmlns:a16="http://schemas.microsoft.com/office/drawing/2014/main" id="{1630554B-A196-B3B8-8382-3C0E61A3D4BA}"/>
+            </a:ext>
+          </a:extLst>
+        </p:cNvPr>
+        <p:cNvGrpSpPr/>
+        <p:nvPr/>
+      </p:nvGrpSpPr>
+      <p:grpSpPr>
+        <a:xfrm>
+          <a:off x="0" y="0"/>
+          <a:ext cx="0" cy="0"/>
+          <a:chOff x="0" y="0"/>
+          <a:chExt cx="0" cy="0"/>
+        </a:xfrm>
+      </p:grpSpPr>
+      <p:sp>
+        <p:nvSpPr>
+          <p:cNvPr id="2" name="Titre 1">
+            <a:extLst>
+              <a:ext uri="{FF2B5EF4-FFF2-40B4-BE49-F238E27FC236}">
+                <a16:creationId xmlns:a16="http://schemas.microsoft.com/office/drawing/2014/main" id="{AB055B42-37C6-FA97-4781-C95431FD7850}"/>
+              </a:ext>
+            </a:extLst>
+          </p:cNvPr>
+          <p:cNvSpPr>
+            <a:spLocks noGrp="1"/>
+          </p:cNvSpPr>
+          <p:nvPr>
+            <p:ph type="title"/>
+          </p:nvPr>
+        </p:nvSpPr>
+        <p:spPr>
+          <a:xfrm>
+            <a:off x="838200" y="222062"/>
+            <a:ext cx="10963274" cy="583781"/>
+          </a:xfrm>
+        </p:spPr>
+        <p:txBody>
+          <a:bodyPr/>
+          <a:lstStyle/>
+          <a:p>
+            <a:r>
+              <a:rPr lang="fr-FR" dirty="0"/>
+              <a:t>Pipeline Training &amp; Monitoring</a:t>
+            </a:r>
+            <a:endParaRPr lang="en-US" dirty="0"/>
+          </a:p>
+        </p:txBody>
+      </p:sp>
+      <p:sp>
+        <p:nvSpPr>
+          <p:cNvPr id="3" name="Espace réservé de la date 2">
+            <a:extLst>
+              <a:ext uri="{FF2B5EF4-FFF2-40B4-BE49-F238E27FC236}">
+                <a16:creationId xmlns:a16="http://schemas.microsoft.com/office/drawing/2014/main" id="{85F3F443-7225-3D08-4477-AFFBE200D995}"/>
+              </a:ext>
+            </a:extLst>
+          </p:cNvPr>
+          <p:cNvSpPr>
+            <a:spLocks noGrp="1"/>
+          </p:cNvSpPr>
+          <p:nvPr>
+            <p:ph type="dt" sz="half" idx="10"/>
+          </p:nvPr>
+        </p:nvSpPr>
+        <p:spPr>
+          <a:xfrm>
+            <a:off x="838200" y="6356350"/>
+            <a:ext cx="2743200" cy="365125"/>
+          </a:xfrm>
+        </p:spPr>
+        <p:txBody>
+          <a:bodyPr/>
+          <a:lstStyle/>
+          <a:p>
+            <a:r>
+              <a:rPr lang="en-US" dirty="0"/>
+              <a:t>2025</a:t>
+            </a:r>
+          </a:p>
+        </p:txBody>
+      </p:sp>
+      <p:sp>
+        <p:nvSpPr>
+          <p:cNvPr id="4" name="Espace réservé du pied de page 3">
+            <a:extLst>
+              <a:ext uri="{FF2B5EF4-FFF2-40B4-BE49-F238E27FC236}">
+                <a16:creationId xmlns:a16="http://schemas.microsoft.com/office/drawing/2014/main" id="{354E9724-58A4-DB4B-39D0-618F88CB45BE}"/>
+              </a:ext>
+            </a:extLst>
+          </p:cNvPr>
+          <p:cNvSpPr>
+            <a:spLocks noGrp="1"/>
+          </p:cNvSpPr>
+          <p:nvPr>
+            <p:ph type="ftr" sz="quarter" idx="11"/>
+          </p:nvPr>
+        </p:nvSpPr>
+        <p:spPr>
+          <a:xfrm>
+            <a:off x="4038600" y="6356350"/>
+            <a:ext cx="4114800" cy="365125"/>
+          </a:xfrm>
+        </p:spPr>
+        <p:txBody>
+          <a:bodyPr/>
+          <a:lstStyle/>
+          <a:p>
+            <a:r>
+              <a:rPr lang="en-US"/>
+              <a:t>Projet classification de documents</a:t>
+            </a:r>
+            <a:endParaRPr lang="en-US" dirty="0"/>
+          </a:p>
+        </p:txBody>
+      </p:sp>
+      <p:sp>
+        <p:nvSpPr>
+          <p:cNvPr id="5" name="Espace réservé du numéro de diapositive 4">
+            <a:extLst>
+              <a:ext uri="{FF2B5EF4-FFF2-40B4-BE49-F238E27FC236}">
+                <a16:creationId xmlns:a16="http://schemas.microsoft.com/office/drawing/2014/main" id="{9842D78A-32A8-2DF8-2218-415C76021386}"/>
+              </a:ext>
+            </a:extLst>
+          </p:cNvPr>
+          <p:cNvSpPr>
+            <a:spLocks noGrp="1"/>
+          </p:cNvSpPr>
+          <p:nvPr>
+            <p:ph type="sldNum" sz="quarter" idx="12"/>
+          </p:nvPr>
+        </p:nvSpPr>
+        <p:spPr>
+          <a:xfrm>
+            <a:off x="8610600" y="6356350"/>
+            <a:ext cx="2743200" cy="365125"/>
+          </a:xfrm>
+        </p:spPr>
+        <p:txBody>
+          <a:bodyPr/>
+          <a:lstStyle/>
+          <a:p>
+            <a:fld id="{B5CEABB6-07DC-46E8-9B57-56EC44A396E5}" type="slidenum">
+              <a:rPr lang="en-US" smtClean="0"/>
+              <a:pPr/>
+              <a:t>4</a:t>
+            </a:fld>
+            <a:endParaRPr lang="en-US" dirty="0"/>
+          </a:p>
+        </p:txBody>
+      </p:sp>
+      <p:sp>
+        <p:nvSpPr>
+          <p:cNvPr id="6" name="Espace réservé du contenu 5">
+            <a:extLst>
+              <a:ext uri="{FF2B5EF4-FFF2-40B4-BE49-F238E27FC236}">
+                <a16:creationId xmlns:a16="http://schemas.microsoft.com/office/drawing/2014/main" id="{EB1AFB43-9FB6-DF5E-C281-E1D16B6C49F7}"/>
+              </a:ext>
+            </a:extLst>
+          </p:cNvPr>
+          <p:cNvSpPr>
+            <a:spLocks noGrp="1"/>
+          </p:cNvSpPr>
+          <p:nvPr>
+            <p:ph sz="quarter" idx="16"/>
+          </p:nvPr>
+        </p:nvSpPr>
+        <p:spPr>
+          <a:xfrm>
             <a:off x="838200" y="1198563"/>
             <a:ext cx="11353800" cy="4900612"/>
           </a:xfrm>
@@ -23307,13 +25614,8 @@
             <a:pPr lvl="1"/>
             <a:r>
               <a:rPr lang="fr-FR" dirty="0"/>
-              <a:t>Orchestration &amp; gestion </a:t>
-            </a:r>
-            <a:r>
-              <a:rPr lang="fr-FR"/>
-              <a:t>des volumes</a:t>
-            </a:r>
-            <a:endParaRPr lang="fr-FR" dirty="0"/>
+              <a:t>Orchestration &amp; gestion des volumes</a:t>
+            </a:r>
           </a:p>
           <a:p>
             <a:r>
@@ -23344,7 +25646,7 @@
           <p:cNvPr id="8" name="Image 7">
             <a:extLst>
               <a:ext uri="{FF2B5EF4-FFF2-40B4-BE49-F238E27FC236}">
-                <a16:creationId xmlns:a16="http://schemas.microsoft.com/office/drawing/2014/main" id="{B72DAC03-AA10-14C2-8BAC-9A545984978D}"/>
+                <a16:creationId xmlns:a16="http://schemas.microsoft.com/office/drawing/2014/main" id="{CD86D711-96DD-57C4-9451-0B0FB451AE17}"/>
               </a:ext>
             </a:extLst>
           </p:cNvPr>
@@ -23374,7 +25676,7 @@
           <p:cNvPr id="7" name="ZoneTexte 6">
             <a:extLst>
               <a:ext uri="{FF2B5EF4-FFF2-40B4-BE49-F238E27FC236}">
-                <a16:creationId xmlns:a16="http://schemas.microsoft.com/office/drawing/2014/main" id="{97FAB25E-404C-41C7-1F77-4AA32919AEEC}"/>
+                <a16:creationId xmlns:a16="http://schemas.microsoft.com/office/drawing/2014/main" id="{4D7A1EF8-A394-F7D6-F0B2-2A09CE6C1673}"/>
               </a:ext>
             </a:extLst>
           </p:cNvPr>
@@ -23665,10 +25967,71 @@
           </a:p>
         </p:txBody>
       </p:sp>
+      <p:sp>
+        <p:nvSpPr>
+          <p:cNvPr id="9" name="ZoneTexte 8">
+            <a:extLst>
+              <a:ext uri="{FF2B5EF4-FFF2-40B4-BE49-F238E27FC236}">
+                <a16:creationId xmlns:a16="http://schemas.microsoft.com/office/drawing/2014/main" id="{67797CEF-DF44-97CB-ABE1-2538143C2729}"/>
+              </a:ext>
+            </a:extLst>
+          </p:cNvPr>
+          <p:cNvSpPr txBox="1"/>
+          <p:nvPr/>
+        </p:nvSpPr>
+        <p:spPr>
+          <a:xfrm>
+            <a:off x="7540658" y="1192785"/>
+            <a:ext cx="3200400" cy="461665"/>
+          </a:xfrm>
+          <a:prstGeom prst="rect">
+            <a:avLst/>
+          </a:prstGeom>
+          <a:noFill/>
+        </p:spPr>
+        <p:txBody>
+          <a:bodyPr wrap="square" rtlCol="0">
+            <a:spAutoFit/>
+          </a:bodyPr>
+          <a:lstStyle/>
+          <a:p>
+            <a:pPr algn="ctr"/>
+            <a:r>
+              <a:rPr lang="fr-FR" sz="2400" b="1" dirty="0">
+                <a:solidFill>
+                  <a:srgbClr val="FFC000"/>
+                </a:solidFill>
+              </a:rPr>
+              <a:t>A SIMPLIFIER</a:t>
+            </a:r>
+            <a:r>
+              <a:rPr lang="fr-FR" b="1" dirty="0">
+                <a:solidFill>
+                  <a:srgbClr val="FFC000"/>
+                </a:solidFill>
+              </a:rPr>
+              <a:t> </a:t>
+            </a:r>
+            <a:r>
+              <a:rPr lang="fr-FR" sz="2400" b="1" dirty="0">
+                <a:solidFill>
+                  <a:srgbClr val="FFC000"/>
+                </a:solidFill>
+              </a:rPr>
+              <a:t>?</a:t>
+            </a:r>
+            <a:endParaRPr lang="fr-FR" b="1" dirty="0">
+              <a:solidFill>
+                <a:srgbClr val="FFC000"/>
+              </a:solidFill>
+            </a:endParaRPr>
+          </a:p>
+        </p:txBody>
+      </p:sp>
     </p:spTree>
     <p:extLst>
       <p:ext uri="{BB962C8B-B14F-4D97-AF65-F5344CB8AC3E}">
-        <p14:creationId xmlns:p14="http://schemas.microsoft.com/office/powerpoint/2010/main" val="3653425637"/>
+        <p14:creationId xmlns:p14="http://schemas.microsoft.com/office/powerpoint/2010/main" val="3295641446"/>
       </p:ext>
     </p:extLst>
   </p:cSld>
@@ -23678,7 +26041,7 @@
 </p:sld>
 </file>
 
-<file path=ppt/slides/slide4.xml><?xml version="1.0" encoding="utf-8"?>
+<file path=ppt/slides/slide5.xml><?xml version="1.0" encoding="utf-8"?>
 <p:sld xmlns:a="http://schemas.openxmlformats.org/drawingml/2006/main" xmlns:r="http://schemas.openxmlformats.org/officeDocument/2006/relationships" xmlns:p="http://schemas.openxmlformats.org/presentationml/2006/main">
   <p:cSld>
     <p:spTree>
@@ -23832,7 +26195,7 @@
             <a:fld id="{B5CEABB6-07DC-46E8-9B57-56EC44A396E5}" type="slidenum">
               <a:rPr lang="en-US" smtClean="0"/>
               <a:pPr/>
-              <a:t>4</a:t>
+              <a:t>5</a:t>
             </a:fld>
             <a:endParaRPr lang="en-US" dirty="0"/>
           </a:p>
@@ -23860,7 +26223,7 @@
         </p:blipFill>
         <p:spPr>
           <a:xfrm>
-            <a:off x="0" y="686124"/>
+            <a:off x="0" y="870599"/>
             <a:ext cx="12192000" cy="5485751"/>
           </a:xfrm>
           <a:prstGeom prst="rect">
@@ -24673,6 +27036,26 @@
 </file>
 
 <file path=customXml/item1.xml><?xml version="1.0" encoding="utf-8"?>
+<p:properties xmlns:p="http://schemas.microsoft.com/office/2006/metadata/properties" xmlns:xsi="http://www.w3.org/2001/XMLSchema-instance" xmlns:pc="http://schemas.microsoft.com/office/infopath/2007/PartnerControls">
+  <documentManagement>
+    <_ip_UnifiedCompliancePolicyUIAction xmlns="http://schemas.microsoft.com/sharepoint/v3" xsi:nil="true"/>
+    <Image xmlns="71af3243-3dd4-4a8d-8c0d-dd76da1f02a5">
+      <Url xsi:nil="true"/>
+      <Description xsi:nil="true"/>
+    </Image>
+    <Status xmlns="71af3243-3dd4-4a8d-8c0d-dd76da1f02a5">Not started</Status>
+    <Background xmlns="71af3243-3dd4-4a8d-8c0d-dd76da1f02a5">false</Background>
+    <_ip_UnifiedCompliancePolicyProperties xmlns="http://schemas.microsoft.com/sharepoint/v3" xsi:nil="true"/>
+    <ImageTagsTaxHTField xmlns="71af3243-3dd4-4a8d-8c0d-dd76da1f02a5">
+      <Terms xmlns="http://schemas.microsoft.com/office/infopath/2007/PartnerControls"/>
+    </ImageTagsTaxHTField>
+    <TaxCatchAll xmlns="230e9df3-be65-4c73-a93b-d1236ebd677e" xsi:nil="true"/>
+    <MediaServiceKeyPoints xmlns="71af3243-3dd4-4a8d-8c0d-dd76da1f02a5" xsi:nil="true"/>
+  </documentManagement>
+</p:properties>
+</file>
+
+<file path=customXml/item2.xml><?xml version="1.0" encoding="utf-8"?>
 <ct:contentTypeSchema xmlns:ct="http://schemas.microsoft.com/office/2006/metadata/contentType" xmlns:ma="http://schemas.microsoft.com/office/2006/metadata/properties/metaAttributes" ct:_="" ma:_="" ma:contentTypeName="Document" ma:contentTypeID="0x01010079F111ED35F8CC479449609E8A0923A6" ma:contentTypeVersion="27" ma:contentTypeDescription="Create a new document." ma:contentTypeScope="" ma:versionID="c6f9a84f66a9c8b9a21755b9ffafb945">
   <xsd:schema xmlns:xsd="http://www.w3.org/2001/XMLSchema" xmlns:xs="http://www.w3.org/2001/XMLSchema" xmlns:p="http://schemas.microsoft.com/office/2006/metadata/properties" xmlns:ns1="http://schemas.microsoft.com/sharepoint/v3" xmlns:ns2="71af3243-3dd4-4a8d-8c0d-dd76da1f02a5" xmlns:ns3="16c05727-aa75-4e4a-9b5f-8a80a1165891" xmlns:ns4="230e9df3-be65-4c73-a93b-d1236ebd677e" targetNamespace="http://schemas.microsoft.com/office/2006/metadata/properties" ma:root="true" ma:fieldsID="27df39e3e7036dff54f89ddd5805ce72" ns1:_="" ns2:_="" ns3:_="" ns4:_="">
     <xsd:import namespace="http://schemas.microsoft.com/sharepoint/v3"/>
@@ -24978,26 +27361,6 @@
 </ct:contentTypeSchema>
 </file>
 
-<file path=customXml/item2.xml><?xml version="1.0" encoding="utf-8"?>
-<p:properties xmlns:p="http://schemas.microsoft.com/office/2006/metadata/properties" xmlns:xsi="http://www.w3.org/2001/XMLSchema-instance" xmlns:pc="http://schemas.microsoft.com/office/infopath/2007/PartnerControls">
-  <documentManagement>
-    <_ip_UnifiedCompliancePolicyUIAction xmlns="http://schemas.microsoft.com/sharepoint/v3" xsi:nil="true"/>
-    <Image xmlns="71af3243-3dd4-4a8d-8c0d-dd76da1f02a5">
-      <Url xsi:nil="true"/>
-      <Description xsi:nil="true"/>
-    </Image>
-    <Status xmlns="71af3243-3dd4-4a8d-8c0d-dd76da1f02a5">Not started</Status>
-    <Background xmlns="71af3243-3dd4-4a8d-8c0d-dd76da1f02a5">false</Background>
-    <_ip_UnifiedCompliancePolicyProperties xmlns="http://schemas.microsoft.com/sharepoint/v3" xsi:nil="true"/>
-    <ImageTagsTaxHTField xmlns="71af3243-3dd4-4a8d-8c0d-dd76da1f02a5">
-      <Terms xmlns="http://schemas.microsoft.com/office/infopath/2007/PartnerControls"/>
-    </ImageTagsTaxHTField>
-    <TaxCatchAll xmlns="230e9df3-be65-4c73-a93b-d1236ebd677e" xsi:nil="true"/>
-    <MediaServiceKeyPoints xmlns="71af3243-3dd4-4a8d-8c0d-dd76da1f02a5" xsi:nil="true"/>
-  </documentManagement>
-</p:properties>
-</file>
-
 <file path=customXml/item3.xml><?xml version="1.0" encoding="utf-8"?>
 <?mso-contentType ?>
 <FormTemplates xmlns="http://schemas.microsoft.com/sharepoint/v3/contenttype/forms">
@@ -25008,6 +27371,18 @@
 </file>
 
 <file path=customXml/itemProps1.xml><?xml version="1.0" encoding="utf-8"?>
+<ds:datastoreItem xmlns:ds="http://schemas.openxmlformats.org/officeDocument/2006/customXml" ds:itemID="{6EA97235-BEC4-4F82-87A8-2F5DAD53B5F9}">
+  <ds:schemaRefs>
+    <ds:schemaRef ds:uri="http://schemas.microsoft.com/office/2006/metadata/properties"/>
+    <ds:schemaRef ds:uri="http://schemas.microsoft.com/office/infopath/2007/PartnerControls"/>
+    <ds:schemaRef ds:uri="http://schemas.microsoft.com/sharepoint/v3"/>
+    <ds:schemaRef ds:uri="71af3243-3dd4-4a8d-8c0d-dd76da1f02a5"/>
+    <ds:schemaRef ds:uri="230e9df3-be65-4c73-a93b-d1236ebd677e"/>
+  </ds:schemaRefs>
+</ds:datastoreItem>
+</file>
+
+<file path=customXml/itemProps2.xml><?xml version="1.0" encoding="utf-8"?>
 <ds:datastoreItem xmlns:ds="http://schemas.openxmlformats.org/officeDocument/2006/customXml" ds:itemID="{2C1F447F-FAA8-4106-988B-648F3C8EDB2D}">
   <ds:schemaRefs>
     <ds:schemaRef ds:uri="http://schemas.microsoft.com/office/2006/metadata/contentType"/>
@@ -25028,18 +27403,6 @@
 </ds:datastoreItem>
 </file>
 
-<file path=customXml/itemProps2.xml><?xml version="1.0" encoding="utf-8"?>
-<ds:datastoreItem xmlns:ds="http://schemas.openxmlformats.org/officeDocument/2006/customXml" ds:itemID="{6EA97235-BEC4-4F82-87A8-2F5DAD53B5F9}">
-  <ds:schemaRefs>
-    <ds:schemaRef ds:uri="http://schemas.microsoft.com/office/2006/metadata/properties"/>
-    <ds:schemaRef ds:uri="http://schemas.microsoft.com/office/infopath/2007/PartnerControls"/>
-    <ds:schemaRef ds:uri="http://schemas.microsoft.com/sharepoint/v3"/>
-    <ds:schemaRef ds:uri="71af3243-3dd4-4a8d-8c0d-dd76da1f02a5"/>
-    <ds:schemaRef ds:uri="230e9df3-be65-4c73-a93b-d1236ebd677e"/>
-  </ds:schemaRefs>
-</ds:datastoreItem>
-</file>
-
 <file path=customXml/itemProps3.xml><?xml version="1.0" encoding="utf-8"?>
 <ds:datastoreItem xmlns:ds="http://schemas.openxmlformats.org/officeDocument/2006/customXml" ds:itemID="{79BF405E-7930-4D5C-ABB3-493E9D6D6CEA}">
   <ds:schemaRefs>

</xml_diff>